<commit_message>
fixing sizes of tect in plots
</commit_message>
<xml_diff>
--- a/GSA_poster_2018.pptx
+++ b/GSA_poster_2018.pptx
@@ -197,7 +197,7 @@
           <a:p>
             <a:fld id="{E9D5D647-1C15-4A30-A144-81BC68FF71DD}" type="datetimeFigureOut">
               <a:rPr lang="en-US" smtClean="0"/>
-              <a:t>3/23/2018</a:t>
+              <a:t>3/28/2018</a:t>
             </a:fld>
             <a:endParaRPr lang="en-US"/>
           </a:p>
@@ -680,7 +680,7 @@
           <a:p>
             <a:fld id="{E7BD01ED-650B-426B-A3A4-BEFB7AC34B2B}" type="datetimeFigureOut">
               <a:rPr lang="en-US" smtClean="0"/>
-              <a:t>3/23/2018</a:t>
+              <a:t>3/28/2018</a:t>
             </a:fld>
             <a:endParaRPr lang="en-US"/>
           </a:p>
@@ -850,7 +850,7 @@
           <a:p>
             <a:fld id="{E7BD01ED-650B-426B-A3A4-BEFB7AC34B2B}" type="datetimeFigureOut">
               <a:rPr lang="en-US" smtClean="0"/>
-              <a:t>3/23/2018</a:t>
+              <a:t>3/28/2018</a:t>
             </a:fld>
             <a:endParaRPr lang="en-US"/>
           </a:p>
@@ -1030,7 +1030,7 @@
           <a:p>
             <a:fld id="{E7BD01ED-650B-426B-A3A4-BEFB7AC34B2B}" type="datetimeFigureOut">
               <a:rPr lang="en-US" smtClean="0"/>
-              <a:t>3/23/2018</a:t>
+              <a:t>3/28/2018</a:t>
             </a:fld>
             <a:endParaRPr lang="en-US"/>
           </a:p>
@@ -1200,7 +1200,7 @@
           <a:p>
             <a:fld id="{E7BD01ED-650B-426B-A3A4-BEFB7AC34B2B}" type="datetimeFigureOut">
               <a:rPr lang="en-US" smtClean="0"/>
-              <a:t>3/23/2018</a:t>
+              <a:t>3/28/2018</a:t>
             </a:fld>
             <a:endParaRPr lang="en-US"/>
           </a:p>
@@ -1444,7 +1444,7 @@
           <a:p>
             <a:fld id="{E7BD01ED-650B-426B-A3A4-BEFB7AC34B2B}" type="datetimeFigureOut">
               <a:rPr lang="en-US" smtClean="0"/>
-              <a:t>3/23/2018</a:t>
+              <a:t>3/28/2018</a:t>
             </a:fld>
             <a:endParaRPr lang="en-US"/>
           </a:p>
@@ -1676,7 +1676,7 @@
           <a:p>
             <a:fld id="{E7BD01ED-650B-426B-A3A4-BEFB7AC34B2B}" type="datetimeFigureOut">
               <a:rPr lang="en-US" smtClean="0"/>
-              <a:t>3/23/2018</a:t>
+              <a:t>3/28/2018</a:t>
             </a:fld>
             <a:endParaRPr lang="en-US"/>
           </a:p>
@@ -2043,7 +2043,7 @@
           <a:p>
             <a:fld id="{E7BD01ED-650B-426B-A3A4-BEFB7AC34B2B}" type="datetimeFigureOut">
               <a:rPr lang="en-US" smtClean="0"/>
-              <a:t>3/23/2018</a:t>
+              <a:t>3/28/2018</a:t>
             </a:fld>
             <a:endParaRPr lang="en-US"/>
           </a:p>
@@ -2161,7 +2161,7 @@
           <a:p>
             <a:fld id="{E7BD01ED-650B-426B-A3A4-BEFB7AC34B2B}" type="datetimeFigureOut">
               <a:rPr lang="en-US" smtClean="0"/>
-              <a:t>3/23/2018</a:t>
+              <a:t>3/28/2018</a:t>
             </a:fld>
             <a:endParaRPr lang="en-US"/>
           </a:p>
@@ -2256,7 +2256,7 @@
           <a:p>
             <a:fld id="{E7BD01ED-650B-426B-A3A4-BEFB7AC34B2B}" type="datetimeFigureOut">
               <a:rPr lang="en-US" smtClean="0"/>
-              <a:t>3/23/2018</a:t>
+              <a:t>3/28/2018</a:t>
             </a:fld>
             <a:endParaRPr lang="en-US"/>
           </a:p>
@@ -2533,7 +2533,7 @@
           <a:p>
             <a:fld id="{E7BD01ED-650B-426B-A3A4-BEFB7AC34B2B}" type="datetimeFigureOut">
               <a:rPr lang="en-US" smtClean="0"/>
-              <a:t>3/23/2018</a:t>
+              <a:t>3/28/2018</a:t>
             </a:fld>
             <a:endParaRPr lang="en-US"/>
           </a:p>
@@ -2790,7 +2790,7 @@
           <a:p>
             <a:fld id="{E7BD01ED-650B-426B-A3A4-BEFB7AC34B2B}" type="datetimeFigureOut">
               <a:rPr lang="en-US" smtClean="0"/>
-              <a:t>3/23/2018</a:t>
+              <a:t>3/28/2018</a:t>
             </a:fld>
             <a:endParaRPr lang="en-US"/>
           </a:p>
@@ -3003,7 +3003,7 @@
           <a:p>
             <a:fld id="{E7BD01ED-650B-426B-A3A4-BEFB7AC34B2B}" type="datetimeFigureOut">
               <a:rPr lang="en-US" smtClean="0"/>
-              <a:t>3/23/2018</a:t>
+              <a:t>3/28/2018</a:t>
             </a:fld>
             <a:endParaRPr lang="en-US"/>
           </a:p>
@@ -3410,6 +3410,118 @@
       </p:grpSpPr>
       <p:sp>
         <p:nvSpPr>
+          <p:cNvPr id="40" name="TextBox 39"/>
+          <p:cNvSpPr txBox="1"/>
+          <p:nvPr/>
+        </p:nvSpPr>
+        <p:spPr>
+          <a:xfrm>
+            <a:off x="991927" y="12832275"/>
+            <a:ext cx="11753736" cy="2554545"/>
+          </a:xfrm>
+          <a:prstGeom prst="rect">
+            <a:avLst/>
+          </a:prstGeom>
+          <a:noFill/>
+        </p:spPr>
+        <p:txBody>
+          <a:bodyPr wrap="square" rtlCol="0">
+            <a:spAutoFit/>
+          </a:bodyPr>
+          <a:lstStyle/>
+          <a:p>
+            <a:pPr marL="457200" indent="-457200">
+              <a:buFont typeface="Arial" panose="020B0604020202020204" pitchFamily="34" charset="0"/>
+              <a:buChar char="•"/>
+            </a:pPr>
+            <a:r>
+              <a:rPr lang="en-US" sz="3200" dirty="0">
+                <a:latin typeface="Frutiger Light Condensed" panose="020B0406020504020204" pitchFamily="34" charset="0"/>
+              </a:rPr>
+              <a:t>Goal: quantify </a:t>
+            </a:r>
+            <a:r>
+              <a:rPr lang="en-US" sz="3200" dirty="0" err="1">
+                <a:latin typeface="Frutiger Light Condensed" panose="020B0406020504020204" pitchFamily="34" charset="0"/>
+              </a:rPr>
+              <a:t>hyporheic</a:t>
+            </a:r>
+            <a:r>
+              <a:rPr lang="en-US" sz="3200" dirty="0">
+                <a:latin typeface="Frutiger Light Condensed" panose="020B0406020504020204" pitchFamily="34" charset="0"/>
+              </a:rPr>
+              <a:t> flux at a sulfate impacted stream site</a:t>
+            </a:r>
+          </a:p>
+          <a:p>
+            <a:pPr marL="457200" indent="-457200">
+              <a:buFont typeface="Arial" panose="020B0604020202020204" pitchFamily="34" charset="0"/>
+              <a:buChar char="•"/>
+            </a:pPr>
+            <a:endParaRPr lang="en-US" sz="3200" dirty="0" smtClean="0">
+              <a:latin typeface="Frutiger Light Condensed" panose="020B0406020504020204" pitchFamily="34" charset="0"/>
+            </a:endParaRPr>
+          </a:p>
+          <a:p>
+            <a:pPr marL="457200" indent="-457200">
+              <a:buFont typeface="Arial" panose="020B0604020202020204" pitchFamily="34" charset="0"/>
+              <a:buChar char="•"/>
+            </a:pPr>
+            <a:r>
+              <a:rPr lang="en-US" sz="3200" dirty="0" smtClean="0">
+                <a:latin typeface="Frutiger Light Condensed" panose="020B0406020504020204" pitchFamily="34" charset="0"/>
+              </a:rPr>
+              <a:t>Site</a:t>
+            </a:r>
+            <a:r>
+              <a:rPr lang="en-US" sz="3200" dirty="0">
+                <a:latin typeface="Frutiger Light Condensed" panose="020B0406020504020204" pitchFamily="34" charset="0"/>
+              </a:rPr>
+              <a:t>: Second Creek is a riparian wetland located in Minnesota’s Iron Range</a:t>
+            </a:r>
+          </a:p>
+          <a:p>
+            <a:pPr marL="457200" indent="-457200">
+              <a:buFont typeface="Arial" panose="020B0604020202020204" pitchFamily="34" charset="0"/>
+              <a:buChar char="•"/>
+            </a:pPr>
+            <a:endParaRPr lang="en-US" sz="3200" dirty="0" smtClean="0">
+              <a:latin typeface="Frutiger Light Condensed" panose="020B0406020504020204" pitchFamily="34" charset="0"/>
+            </a:endParaRPr>
+          </a:p>
+          <a:p>
+            <a:endParaRPr lang="en-US" sz="3200" dirty="0">
+              <a:latin typeface="Frutiger Light Condensed" panose="020B0406020504020204" pitchFamily="34" charset="0"/>
+            </a:endParaRPr>
+          </a:p>
+        </p:txBody>
+      </p:sp>
+      <p:pic>
+        <p:nvPicPr>
+          <p:cNvPr id="21" name="Picture 20"/>
+          <p:cNvPicPr>
+            <a:picLocks noChangeAspect="1"/>
+          </p:cNvPicPr>
+          <p:nvPr/>
+        </p:nvPicPr>
+        <p:blipFill>
+          <a:blip r:embed="rId3"/>
+          <a:stretch>
+            <a:fillRect/>
+          </a:stretch>
+        </p:blipFill>
+        <p:spPr>
+          <a:xfrm>
+            <a:off x="705941" y="18781283"/>
+            <a:ext cx="8077200" cy="5200650"/>
+          </a:xfrm>
+          <a:prstGeom prst="rect">
+            <a:avLst/>
+          </a:prstGeom>
+        </p:spPr>
+      </p:pic>
+      <p:sp>
+        <p:nvSpPr>
           <p:cNvPr id="2" name="TextBox 1"/>
           <p:cNvSpPr txBox="1"/>
           <p:nvPr/>
@@ -3470,7 +3582,27 @@
                 <a:latin typeface="Frutiger Light Condensed" panose="020B0406020504020204" pitchFamily="34" charset="0"/>
                 <a:cs typeface="Times New Roman" panose="02020603050405020304" pitchFamily="18" charset="0"/>
               </a:rPr>
-              <a:t>Quantifying Surface water-Groundwater exchange using Temperature Profile Inverse modeling in a Riparian Wetland</a:t>
+              <a:t>Quantifying Surface </a:t>
+            </a:r>
+            <a:r>
+              <a:rPr lang="en-US" sz="8500" b="1" dirty="0" smtClean="0">
+                <a:solidFill>
+                  <a:srgbClr val="7A0019"/>
+                </a:solidFill>
+                <a:latin typeface="Frutiger Light Condensed" panose="020B0406020504020204" pitchFamily="34" charset="0"/>
+                <a:cs typeface="Times New Roman" panose="02020603050405020304" pitchFamily="18" charset="0"/>
+              </a:rPr>
+              <a:t>Water-Groundwater Exchange Using </a:t>
+            </a:r>
+            <a:r>
+              <a:rPr lang="en-US" sz="8500" b="1" dirty="0" smtClean="0">
+                <a:solidFill>
+                  <a:srgbClr val="7A0019"/>
+                </a:solidFill>
+                <a:latin typeface="Frutiger Light Condensed" panose="020B0406020504020204" pitchFamily="34" charset="0"/>
+                <a:cs typeface="Times New Roman" panose="02020603050405020304" pitchFamily="18" charset="0"/>
+              </a:rPr>
+              <a:t>Temperature Profile Inverse modeling in a Riparian Wetland</a:t>
             </a:r>
             <a:endParaRPr lang="en-US" sz="8500" b="1" dirty="0">
               <a:solidFill>
@@ -3491,7 +3623,7 @@
           <p:nvPr/>
         </p:nvPicPr>
         <p:blipFill>
-          <a:blip r:embed="rId3">
+          <a:blip r:embed="rId4">
             <a:extLst>
               <a:ext uri="{28A0092B-C50C-407E-A947-70E740481C1C}">
                 <a14:useLocalDpi xmlns:a14="http://schemas.microsoft.com/office/drawing/2010/main" val="0"/>
@@ -3593,61 +3725,73 @@
               <a:rPr lang="en-US" sz="6000" dirty="0" smtClean="0">
                 <a:latin typeface="Frutiger Light Condensed" panose="020B0406020504020204" pitchFamily="34" charset="0"/>
               </a:rPr>
-              <a:t>Jack Lange</a:t>
-            </a:r>
-            <a:r>
-              <a:rPr lang="en-US" sz="6000" baseline="30000" dirty="0" smtClean="0">
-                <a:latin typeface="Frutiger Light Condensed" panose="020B0406020504020204" pitchFamily="34" charset="0"/>
-              </a:rPr>
-              <a:t>1</a:t>
+              <a:t>Jack </a:t>
             </a:r>
             <a:r>
               <a:rPr lang="en-US" sz="6000" dirty="0" smtClean="0">
                 <a:latin typeface="Frutiger Light Condensed" panose="020B0406020504020204" pitchFamily="34" charset="0"/>
               </a:rPr>
-              <a:t>,  G.-H. Crystal Ng</a:t>
-            </a:r>
-            <a:r>
-              <a:rPr lang="en-US" sz="6000" baseline="30000" dirty="0">
-                <a:latin typeface="Frutiger Light Condensed" panose="020B0406020504020204" pitchFamily="34" charset="0"/>
-              </a:rPr>
-              <a:t>1</a:t>
+              <a:t>Lange,  </a:t>
             </a:r>
             <a:r>
               <a:rPr lang="en-US" sz="6000" dirty="0" smtClean="0">
                 <a:latin typeface="Frutiger Light Condensed" panose="020B0406020504020204" pitchFamily="34" charset="0"/>
               </a:rPr>
-              <a:t>, Amanda R. Yourd</a:t>
-            </a:r>
-            <a:r>
-              <a:rPr lang="en-US" sz="6000" baseline="30000" dirty="0" smtClean="0">
-                <a:latin typeface="Frutiger Light Condensed" panose="020B0406020504020204" pitchFamily="34" charset="0"/>
-              </a:rPr>
-              <a:t>1</a:t>
+              <a:t>G.-H. Crystal </a:t>
             </a:r>
             <a:r>
               <a:rPr lang="en-US" sz="6000" dirty="0" smtClean="0">
                 <a:latin typeface="Frutiger Light Condensed" panose="020B0406020504020204" pitchFamily="34" charset="0"/>
               </a:rPr>
-              <a:t>, Chad Sandell</a:t>
-            </a:r>
-            <a:r>
-              <a:rPr lang="en-US" sz="6000" baseline="30000" dirty="0" smtClean="0">
-                <a:latin typeface="Frutiger Light Condensed" panose="020B0406020504020204" pitchFamily="34" charset="0"/>
-              </a:rPr>
-              <a:t>1</a:t>
+              <a:t>Ng, </a:t>
             </a:r>
             <a:r>
               <a:rPr lang="en-US" sz="6000" dirty="0" smtClean="0">
                 <a:latin typeface="Frutiger Light Condensed" panose="020B0406020504020204" pitchFamily="34" charset="0"/>
               </a:rPr>
-              <a:t> , Andrew D Wickert</a:t>
-            </a:r>
-            <a:r>
-              <a:rPr lang="en-US" sz="6000" baseline="30000" dirty="0" smtClean="0">
-                <a:latin typeface="Frutiger Light Condensed" panose="020B0406020504020204" pitchFamily="34" charset="0"/>
-              </a:rPr>
-              <a:t>1</a:t>
+              <a:t>Amanda R. </a:t>
+            </a:r>
+            <a:r>
+              <a:rPr lang="en-US" sz="6000" dirty="0" err="1" smtClean="0">
+                <a:latin typeface="Frutiger Light Condensed" panose="020B0406020504020204" pitchFamily="34" charset="0"/>
+              </a:rPr>
+              <a:t>Yourd</a:t>
+            </a:r>
+            <a:r>
+              <a:rPr lang="en-US" sz="6000" dirty="0" smtClean="0">
+                <a:latin typeface="Frutiger Light Condensed" panose="020B0406020504020204" pitchFamily="34" charset="0"/>
+              </a:rPr>
+              <a:t>, </a:t>
+            </a:r>
+            <a:r>
+              <a:rPr lang="en-US" sz="6000" dirty="0" smtClean="0">
+                <a:latin typeface="Frutiger Light Condensed" panose="020B0406020504020204" pitchFamily="34" charset="0"/>
+              </a:rPr>
+              <a:t>Chad </a:t>
+            </a:r>
+            <a:r>
+              <a:rPr lang="en-US" sz="6000" dirty="0" err="1" smtClean="0">
+                <a:latin typeface="Frutiger Light Condensed" panose="020B0406020504020204" pitchFamily="34" charset="0"/>
+              </a:rPr>
+              <a:t>Sandell</a:t>
+            </a:r>
+            <a:r>
+              <a:rPr lang="en-US" sz="6000" dirty="0" smtClean="0">
+                <a:latin typeface="Frutiger Light Condensed" panose="020B0406020504020204" pitchFamily="34" charset="0"/>
+              </a:rPr>
+              <a:t> </a:t>
+            </a:r>
+            <a:r>
+              <a:rPr lang="en-US" sz="6000" dirty="0" smtClean="0">
+                <a:latin typeface="Frutiger Light Condensed" panose="020B0406020504020204" pitchFamily="34" charset="0"/>
+              </a:rPr>
+              <a:t>, Andrew D </a:t>
+            </a:r>
+            <a:r>
+              <a:rPr lang="en-US" sz="6000" dirty="0" err="1" smtClean="0">
+                <a:latin typeface="Frutiger Light Condensed" panose="020B0406020504020204" pitchFamily="34" charset="0"/>
+              </a:rPr>
+              <a:t>Wickert</a:t>
             </a:r>
             <a:endParaRPr lang="en-US" sz="6000" dirty="0" smtClean="0">
               <a:latin typeface="Frutiger Light Condensed" panose="020B0406020504020204" pitchFamily="34" charset="0"/>
@@ -3656,16 +3800,16 @@
           <a:p>
             <a:pPr algn="ctr"/>
             <a:r>
-              <a:rPr lang="en-US" sz="6000" i="1" baseline="30000" dirty="0">
-                <a:latin typeface="Frutiger Light Condensed" panose="020B0406020504020204" pitchFamily="34" charset="0"/>
-              </a:rPr>
-              <a:t>1</a:t>
-            </a:r>
-            <a:r>
               <a:rPr lang="en-US" sz="6000" i="1" dirty="0" smtClean="0">
                 <a:latin typeface="Frutiger Light Condensed" panose="020B0406020504020204" pitchFamily="34" charset="0"/>
               </a:rPr>
-              <a:t>Dept. of Earth Sciences, University of Minnesota Twin-Cities</a:t>
+              <a:t>Dept</a:t>
+            </a:r>
+            <a:r>
+              <a:rPr lang="en-US" sz="6000" i="1" dirty="0" smtClean="0">
+                <a:latin typeface="Frutiger Light Condensed" panose="020B0406020504020204" pitchFamily="34" charset="0"/>
+              </a:rPr>
+              <a:t>. of Earth Sciences, University of Minnesota Twin-Cities</a:t>
             </a:r>
             <a:endParaRPr lang="en-US" sz="6000" i="1" dirty="0">
               <a:latin typeface="Frutiger Light Condensed" panose="020B0406020504020204" pitchFamily="34" charset="0"/>
@@ -3705,7 +3849,7 @@
                 </a:solidFill>
                 <a:latin typeface="Frutiger Light Condensed" panose="020B0406020504020204" pitchFamily="34" charset="0"/>
               </a:rPr>
-              <a:t>Study Site and Motivation</a:t>
+              <a:t>Introduction</a:t>
             </a:r>
             <a:endParaRPr lang="en-US" sz="6000" dirty="0">
               <a:solidFill>
@@ -3898,7 +4042,7 @@
         </p:nvSpPr>
         <p:spPr>
           <a:xfrm>
-            <a:off x="653013" y="14992556"/>
+            <a:off x="615061" y="14594887"/>
             <a:ext cx="11767587" cy="1015663"/>
           </a:xfrm>
           <a:prstGeom prst="rect">
@@ -3922,7 +4066,7 @@
                 </a:solidFill>
                 <a:latin typeface="Frutiger Light Condensed" panose="020B0406020504020204" pitchFamily="34" charset="0"/>
               </a:rPr>
-              <a:t>Inverse Model Theory</a:t>
+              <a:t>Methods</a:t>
             </a:r>
             <a:endParaRPr lang="en-US" sz="6000" dirty="0">
               <a:solidFill>
@@ -4028,7 +4172,7 @@
           <p:nvPr/>
         </p:nvPicPr>
         <p:blipFill>
-          <a:blip r:embed="rId4"/>
+          <a:blip r:embed="rId5"/>
           <a:stretch>
             <a:fillRect/>
           </a:stretch>
@@ -4052,7 +4196,7 @@
           <p:nvPr/>
         </p:nvPicPr>
         <p:blipFill>
-          <a:blip r:embed="rId5"/>
+          <a:blip r:embed="rId6"/>
           <a:stretch>
             <a:fillRect/>
           </a:stretch>
@@ -4400,17 +4544,8 @@
               <a:rPr lang="en-US" sz="3200" dirty="0" smtClean="0">
                 <a:latin typeface="Frutiger Light Condensed" panose="020B0406020504020204" pitchFamily="34" charset="0"/>
               </a:rPr>
-              <a:t>collocated with </a:t>
-            </a:r>
-            <a:r>
-              <a:rPr lang="en-US" sz="3200" dirty="0" smtClean="0">
-                <a:latin typeface="Frutiger Light Condensed" panose="020B0406020504020204" pitchFamily="34" charset="0"/>
-              </a:rPr>
-              <a:t>piezometers across the site</a:t>
-            </a:r>
-            <a:endParaRPr lang="en-US" sz="3200" dirty="0" smtClean="0">
-              <a:latin typeface="Frutiger Light Condensed" panose="020B0406020504020204" pitchFamily="34" charset="0"/>
-            </a:endParaRPr>
+              <a:t>collocated with piezometers across the site</a:t>
+            </a:r>
           </a:p>
           <a:p>
             <a:pPr marL="285750" indent="-285750">
@@ -4421,31 +4556,19 @@
               <a:rPr lang="en-US" sz="3200" dirty="0" smtClean="0">
                 <a:latin typeface="Frutiger Light Condensed" panose="020B0406020504020204" pitchFamily="34" charset="0"/>
               </a:rPr>
-              <a:t>Pressure and temperature was measured at </a:t>
+              <a:t>Pressure and temperature was measured at 15 </a:t>
+            </a:r>
+            <a:r>
+              <a:rPr lang="en-US" sz="3200" dirty="0">
+                <a:latin typeface="Frutiger Light Condensed" panose="020B0406020504020204" pitchFamily="34" charset="0"/>
+              </a:rPr>
+              <a:t>minute intervals to capture diurnal variability </a:t>
             </a:r>
             <a:r>
               <a:rPr lang="en-US" sz="3200" dirty="0" smtClean="0">
                 <a:latin typeface="Frutiger Light Condensed" panose="020B0406020504020204" pitchFamily="34" charset="0"/>
               </a:rPr>
-              <a:t>15 </a:t>
-            </a:r>
-            <a:r>
-              <a:rPr lang="en-US" sz="3200" dirty="0">
-                <a:latin typeface="Frutiger Light Condensed" panose="020B0406020504020204" pitchFamily="34" charset="0"/>
-              </a:rPr>
-              <a:t>minute intervals to capture diurnal variability </a:t>
-            </a:r>
-            <a:r>
-              <a:rPr lang="en-US" sz="3200" dirty="0" smtClean="0">
-                <a:latin typeface="Frutiger Light Condensed" panose="020B0406020504020204" pitchFamily="34" charset="0"/>
-              </a:rPr>
-              <a:t>over the </a:t>
-            </a:r>
-            <a:r>
-              <a:rPr lang="en-US" sz="3200" dirty="0" smtClean="0">
-                <a:latin typeface="Frutiger Light Condensed" panose="020B0406020504020204" pitchFamily="34" charset="0"/>
-              </a:rPr>
-              <a:t>summer</a:t>
+              <a:t>over the summer</a:t>
             </a:r>
           </a:p>
           <a:p>
@@ -4459,9 +4582,6 @@
               </a:rPr>
               <a:t>Rainfall data supplied by the nearby Embarrass, MN weather station </a:t>
             </a:r>
-            <a:endParaRPr lang="en-US" sz="3200" dirty="0" smtClean="0">
-              <a:latin typeface="Frutiger Light Condensed" panose="020B0406020504020204" pitchFamily="34" charset="0"/>
-            </a:endParaRPr>
           </a:p>
           <a:p>
             <a:r>
@@ -4481,7 +4601,7 @@
           <p:nvPr/>
         </p:nvPicPr>
         <p:blipFill>
-          <a:blip r:embed="rId6">
+          <a:blip r:embed="rId7">
             <a:extLst>
               <a:ext uri="{28A0092B-C50C-407E-A947-70E740481C1C}">
                 <a14:useLocalDpi xmlns:a14="http://schemas.microsoft.com/office/drawing/2010/main" val="0"/>
@@ -4703,7 +4823,7 @@
           <p:nvPr/>
         </p:nvPicPr>
         <p:blipFill>
-          <a:blip r:embed="rId7"/>
+          <a:blip r:embed="rId8"/>
           <a:stretch>
             <a:fillRect/>
           </a:stretch>
@@ -4726,8 +4846,8 @@
         </p:nvSpPr>
         <p:spPr>
           <a:xfrm>
-            <a:off x="6995883" y="7946618"/>
-            <a:ext cx="5424717" cy="4524315"/>
+            <a:off x="6953303" y="8047176"/>
+            <a:ext cx="5694940" cy="4524315"/>
           </a:xfrm>
           <a:prstGeom prst="rect">
             <a:avLst/>
@@ -4745,28 +4865,16 @@
               <a:buChar char="•"/>
             </a:pPr>
             <a:r>
+              <a:rPr lang="en-US" sz="3200" dirty="0">
+                <a:latin typeface="Frutiger Light Condensed" panose="020B0406020504020204" pitchFamily="34" charset="0"/>
+              </a:rPr>
+              <a:t>Motivation: understand how mining derived sulfate affects biogeochemical cycling in first order streams on the iron </a:t>
+            </a:r>
+            <a:r>
               <a:rPr lang="en-US" sz="3200" dirty="0" smtClean="0">
                 <a:latin typeface="Frutiger Light Condensed" panose="020B0406020504020204" pitchFamily="34" charset="0"/>
               </a:rPr>
-              <a:t>Second Creek is a wild rice stream located in Minnesota’s </a:t>
-            </a:r>
-            <a:r>
-              <a:rPr lang="en-US" sz="3200" dirty="0">
-                <a:latin typeface="Frutiger Light Condensed" panose="020B0406020504020204" pitchFamily="34" charset="0"/>
-              </a:rPr>
-              <a:t>I</a:t>
-            </a:r>
-            <a:r>
-              <a:rPr lang="en-US" sz="3200" dirty="0" smtClean="0">
-                <a:latin typeface="Frutiger Light Condensed" panose="020B0406020504020204" pitchFamily="34" charset="0"/>
-              </a:rPr>
-              <a:t>ron </a:t>
-            </a:r>
-            <a:r>
-              <a:rPr lang="en-US" sz="3200" dirty="0" smtClean="0">
-                <a:latin typeface="Frutiger Light Condensed" panose="020B0406020504020204" pitchFamily="34" charset="0"/>
-              </a:rPr>
-              <a:t>Range</a:t>
+              <a:t>range</a:t>
             </a:r>
           </a:p>
           <a:p>
@@ -4774,12 +4882,6 @@
               <a:buFont typeface="Arial" panose="020B0604020202020204" pitchFamily="34" charset="0"/>
               <a:buChar char="•"/>
             </a:pPr>
-            <a:r>
-              <a:rPr lang="en-US" sz="3200" dirty="0" smtClean="0">
-                <a:latin typeface="Frutiger Light Condensed" panose="020B0406020504020204" pitchFamily="34" charset="0"/>
-              </a:rPr>
-              <a:t>Regional groundwater flow is west to east</a:t>
-            </a:r>
             <a:endParaRPr lang="en-US" sz="3200" dirty="0" smtClean="0">
               <a:latin typeface="Frutiger Light Condensed" panose="020B0406020504020204" pitchFamily="34" charset="0"/>
             </a:endParaRPr>
@@ -4790,44 +4892,59 @@
               <a:buChar char="•"/>
             </a:pPr>
             <a:r>
+              <a:rPr lang="en-US" sz="3200" dirty="0" err="1" smtClean="0">
+                <a:latin typeface="Frutiger Light Condensed" panose="020B0406020504020204" pitchFamily="34" charset="0"/>
+              </a:rPr>
+              <a:t>Hyporheic</a:t>
+            </a:r>
+            <a:r>
               <a:rPr lang="en-US" sz="3200" dirty="0" smtClean="0">
                 <a:latin typeface="Frutiger Light Condensed" panose="020B0406020504020204" pitchFamily="34" charset="0"/>
               </a:rPr>
-              <a:t>Want to understand how mining derived sulfate affects biogeochemical cycling at Second </a:t>
+              <a:t> </a:t>
+            </a:r>
+            <a:r>
+              <a:rPr lang="en-US" sz="3200" dirty="0">
+                <a:latin typeface="Frutiger Light Condensed" panose="020B0406020504020204" pitchFamily="34" charset="0"/>
+              </a:rPr>
+              <a:t>flux controls the sediment geochemical gradient </a:t>
             </a:r>
             <a:r>
               <a:rPr lang="en-US" sz="3200" dirty="0" smtClean="0">
                 <a:latin typeface="Frutiger Light Condensed" panose="020B0406020504020204" pitchFamily="34" charset="0"/>
               </a:rPr>
-              <a:t>Creek</a:t>
-            </a:r>
+              <a:t>[</a:t>
+            </a:r>
+            <a:r>
+              <a:rPr lang="en-US" sz="3200" dirty="0">
+                <a:latin typeface="Frutiger Light Condensed" panose="020B0406020504020204" pitchFamily="34" charset="0"/>
+              </a:rPr>
+              <a:t>Hayashi &amp; </a:t>
+            </a:r>
+            <a:r>
+              <a:rPr lang="en-US" sz="3200" dirty="0" err="1">
+                <a:latin typeface="Frutiger Light Condensed" panose="020B0406020504020204" pitchFamily="34" charset="0"/>
+              </a:rPr>
+              <a:t>Rosenberry</a:t>
+            </a:r>
+            <a:r>
+              <a:rPr lang="en-US" sz="3200" dirty="0">
+                <a:latin typeface="Frutiger Light Condensed" panose="020B0406020504020204" pitchFamily="34" charset="0"/>
+              </a:rPr>
+              <a:t> 2002; Kurtz et al. 2007</a:t>
+            </a:r>
+            <a:r>
+              <a:rPr lang="en-US" sz="3200" dirty="0" smtClean="0">
+                <a:latin typeface="Frutiger Light Condensed" panose="020B0406020504020204" pitchFamily="34" charset="0"/>
+              </a:rPr>
+              <a:t>.]</a:t>
+            </a:r>
+            <a:endParaRPr lang="en-US" sz="3200" dirty="0" smtClean="0">
+              <a:latin typeface="Frutiger Light Condensed" panose="020B0406020504020204" pitchFamily="34" charset="0"/>
+            </a:endParaRPr>
           </a:p>
         </p:txBody>
       </p:sp>
-      <p:pic>
-        <p:nvPicPr>
-          <p:cNvPr id="42" name="Picture 41"/>
-          <p:cNvPicPr>
-            <a:picLocks noChangeAspect="1"/>
-          </p:cNvPicPr>
-          <p:nvPr/>
-        </p:nvPicPr>
-        <p:blipFill>
-          <a:blip r:embed="rId8"/>
-          <a:stretch>
-            <a:fillRect/>
-          </a:stretch>
-        </p:blipFill>
-        <p:spPr>
-          <a:xfrm>
-            <a:off x="653012" y="16421869"/>
-            <a:ext cx="8072323" cy="5192563"/>
-          </a:xfrm>
-          <a:prstGeom prst="rect">
-            <a:avLst/>
-          </a:prstGeom>
-        </p:spPr>
-      </p:pic>
       <mc:AlternateContent xmlns:mc="http://schemas.openxmlformats.org/markup-compatibility/2006">
         <mc:Choice xmlns:a14="http://schemas.microsoft.com/office/drawing/2010/main" Requires="a14">
           <p:sp>
@@ -4838,8 +4955,8 @@
             </p:nvSpPr>
             <p:spPr>
               <a:xfrm>
-                <a:off x="3750261" y="23048976"/>
-                <a:ext cx="1875835" cy="793551"/>
+                <a:off x="8394355" y="17146735"/>
+                <a:ext cx="1598835" cy="676660"/>
               </a:xfrm>
               <a:prstGeom prst="rect">
                 <a:avLst/>
@@ -4861,14 +4978,14 @@
                       <m:sSub>
                         <m:sSubPr>
                           <m:ctrlPr>
-                            <a:rPr lang="en-US" sz="2400" i="1">
+                            <a:rPr lang="en-US" sz="2000" i="1">
                               <a:latin typeface="Cambria Math" panose="02040503050406030204" pitchFamily="18" charset="0"/>
                             </a:rPr>
                           </m:ctrlPr>
                         </m:sSubPr>
                         <m:e>
                           <m:r>
-                            <a:rPr lang="en-US" sz="2400" i="1">
+                            <a:rPr lang="en-US" sz="2000" i="1">
                               <a:latin typeface="Cambria Math" panose="02040503050406030204" pitchFamily="18" charset="0"/>
                             </a:rPr>
                             <m:t>𝑞</m:t>
@@ -4876,7 +4993,7 @@
                         </m:e>
                         <m:sub>
                           <m:r>
-                            <a:rPr lang="en-US" sz="2400" i="1">
+                            <a:rPr lang="en-US" sz="2000" i="1">
                               <a:latin typeface="Cambria Math" panose="02040503050406030204" pitchFamily="18" charset="0"/>
                             </a:rPr>
                             <m:t>𝑧</m:t>
@@ -4884,13 +5001,13 @@
                         </m:sub>
                       </m:sSub>
                       <m:r>
-                        <a:rPr lang="en-US" sz="2400" i="0">
+                        <a:rPr lang="en-US" sz="2000" i="0">
                           <a:latin typeface="Cambria Math" panose="02040503050406030204" pitchFamily="18" charset="0"/>
                         </a:rPr>
                         <m:t>= −</m:t>
                       </m:r>
                       <m:r>
-                        <a:rPr lang="en-US" sz="2400" i="1">
+                        <a:rPr lang="en-US" sz="2000" i="1">
                           <a:latin typeface="Cambria Math" panose="02040503050406030204" pitchFamily="18" charset="0"/>
                         </a:rPr>
                         <m:t>𝐾</m:t>
@@ -4898,14 +5015,14 @@
                       <m:f>
                         <m:fPr>
                           <m:ctrlPr>
-                            <a:rPr lang="en-US" sz="2400" i="1">
+                            <a:rPr lang="en-US" sz="2000" i="1">
                               <a:latin typeface="Cambria Math" panose="02040503050406030204" pitchFamily="18" charset="0"/>
                             </a:rPr>
                           </m:ctrlPr>
                         </m:fPr>
                         <m:num>
                           <m:r>
-                            <a:rPr lang="en-US" sz="2400" i="1">
+                            <a:rPr lang="en-US" sz="2000" i="1">
                               <a:latin typeface="Cambria Math" panose="02040503050406030204" pitchFamily="18" charset="0"/>
                             </a:rPr>
                             <m:t>𝑑h</m:t>
@@ -4913,7 +5030,7 @@
                         </m:num>
                         <m:den>
                           <m:r>
-                            <a:rPr lang="en-US" sz="2400" i="1">
+                            <a:rPr lang="en-US" sz="2000" i="1">
                               <a:latin typeface="Cambria Math" panose="02040503050406030204" pitchFamily="18" charset="0"/>
                             </a:rPr>
                             <m:t>𝑑𝑧</m:t>
@@ -4923,7 +5040,7 @@
                     </m:oMath>
                   </m:oMathPara>
                 </a14:m>
-                <a:endParaRPr lang="en-US" sz="2400" dirty="0"/>
+                <a:endParaRPr lang="en-US" sz="2000" dirty="0"/>
               </a:p>
             </p:txBody>
           </p:sp>
@@ -4939,8 +5056,8 @@
             </p:nvSpPr>
             <p:spPr>
               <a:xfrm>
-                <a:off x="3750261" y="23048976"/>
-                <a:ext cx="1875835" cy="793551"/>
+                <a:off x="8394355" y="17146735"/>
+                <a:ext cx="1598835" cy="676660"/>
               </a:xfrm>
               <a:prstGeom prst="rect">
                 <a:avLst/>
@@ -4977,8 +5094,8 @@
             </p:nvSpPr>
             <p:spPr>
               <a:xfrm>
-                <a:off x="704873" y="22254083"/>
-                <a:ext cx="8148699" cy="1202765"/>
+                <a:off x="5413159" y="16167854"/>
+                <a:ext cx="8148699" cy="1017651"/>
               </a:xfrm>
               <a:prstGeom prst="rect">
                 <a:avLst/>
@@ -5000,20 +5117,20 @@
                       <m:sSub>
                         <m:sSubPr>
                           <m:ctrlPr>
-                            <a:rPr lang="en-US" sz="2400" i="1">
+                            <a:rPr lang="en-US" sz="2000" i="1">
                               <a:latin typeface="Cambria Math" panose="02040503050406030204" pitchFamily="18" charset="0"/>
                             </a:rPr>
                           </m:ctrlPr>
                         </m:sSubPr>
                         <m:e>
                           <m:r>
-                            <a:rPr lang="en-US" sz="2400" i="1">
+                            <a:rPr lang="en-US" sz="2000" i="1">
                               <a:latin typeface="Cambria Math" panose="02040503050406030204" pitchFamily="18" charset="0"/>
                             </a:rPr>
                             <m:t>(</m:t>
                           </m:r>
                           <m:r>
-                            <a:rPr lang="en-US" sz="2400" i="1">
+                            <a:rPr lang="en-US" sz="2000" i="1">
                               <a:latin typeface="Cambria Math" panose="02040503050406030204" pitchFamily="18" charset="0"/>
                             </a:rPr>
                             <m:t>𝜆</m:t>
@@ -5021,7 +5138,7 @@
                         </m:e>
                         <m:sub>
                           <m:r>
-                            <a:rPr lang="en-US" sz="2400" i="1">
+                            <a:rPr lang="en-US" sz="2000" i="1">
                               <a:latin typeface="Cambria Math" panose="02040503050406030204" pitchFamily="18" charset="0"/>
                             </a:rPr>
                             <m:t>𝑠</m:t>
@@ -5029,7 +5146,7 @@
                         </m:sub>
                       </m:sSub>
                       <m:r>
-                        <a:rPr lang="en-US" sz="2400" i="1">
+                        <a:rPr lang="en-US" sz="2000" i="1">
                           <a:latin typeface="Cambria Math" panose="02040503050406030204" pitchFamily="18" charset="0"/>
                         </a:rPr>
                         <m:t>+</m:t>
@@ -5037,14 +5154,14 @@
                       <m:sSub>
                         <m:sSubPr>
                           <m:ctrlPr>
-                            <a:rPr lang="en-US" sz="2400" i="1">
+                            <a:rPr lang="en-US" sz="2000" i="1">
                               <a:latin typeface="Cambria Math" panose="02040503050406030204" pitchFamily="18" charset="0"/>
                             </a:rPr>
                           </m:ctrlPr>
                         </m:sSubPr>
                         <m:e>
                           <m:r>
-                            <a:rPr lang="en-US" sz="2400" i="1">
+                            <a:rPr lang="en-US" sz="2000" i="1">
                               <a:latin typeface="Cambria Math" panose="02040503050406030204" pitchFamily="18" charset="0"/>
                             </a:rPr>
                             <m:t>𝑞</m:t>
@@ -5052,7 +5169,7 @@
                         </m:e>
                         <m:sub>
                           <m:r>
-                            <a:rPr lang="en-US" sz="2400" i="1">
+                            <a:rPr lang="en-US" sz="2000" i="1">
                               <a:latin typeface="Cambria Math" panose="02040503050406030204" pitchFamily="18" charset="0"/>
                             </a:rPr>
                             <m:t>𝑧</m:t>
@@ -5060,7 +5177,7 @@
                         </m:sub>
                       </m:sSub>
                       <m:r>
-                        <a:rPr lang="en-US" sz="2400" i="1">
+                        <a:rPr lang="en-US" sz="2000" i="1">
                           <a:latin typeface="Cambria Math" panose="02040503050406030204" pitchFamily="18" charset="0"/>
                         </a:rPr>
                         <m:t>𝛼</m:t>
@@ -5068,14 +5185,14 @@
                       <m:sSub>
                         <m:sSubPr>
                           <m:ctrlPr>
-                            <a:rPr lang="en-US" sz="2400" i="1">
+                            <a:rPr lang="en-US" sz="2000" i="1">
                               <a:latin typeface="Cambria Math" panose="02040503050406030204" pitchFamily="18" charset="0"/>
                             </a:rPr>
                           </m:ctrlPr>
                         </m:sSubPr>
                         <m:e>
                           <m:r>
-                            <a:rPr lang="en-US" sz="2400" i="1">
+                            <a:rPr lang="en-US" sz="2000" i="1">
                               <a:latin typeface="Cambria Math" panose="02040503050406030204" pitchFamily="18" charset="0"/>
                             </a:rPr>
                             <m:t>𝐶</m:t>
@@ -5083,7 +5200,7 @@
                         </m:e>
                         <m:sub>
                           <m:r>
-                            <a:rPr lang="en-US" sz="2400" i="1">
+                            <a:rPr lang="en-US" sz="2000" i="1">
                               <a:latin typeface="Cambria Math" panose="02040503050406030204" pitchFamily="18" charset="0"/>
                             </a:rPr>
                             <m:t>𝑤</m:t>
@@ -5091,7 +5208,7 @@
                         </m:sub>
                       </m:sSub>
                       <m:r>
-                        <a:rPr lang="en-US" sz="2400" i="1">
+                        <a:rPr lang="en-US" sz="2000" i="1">
                           <a:latin typeface="Cambria Math" panose="02040503050406030204" pitchFamily="18" charset="0"/>
                         </a:rPr>
                         <m:t>)</m:t>
@@ -5099,7 +5216,7 @@
                       <m:f>
                         <m:fPr>
                           <m:ctrlPr>
-                            <a:rPr lang="en-US" sz="2400" i="1">
+                            <a:rPr lang="en-US" sz="2000" i="1">
                               <a:latin typeface="Cambria Math" panose="02040503050406030204" pitchFamily="18" charset="0"/>
                             </a:rPr>
                           </m:ctrlPr>
@@ -5108,14 +5225,14 @@
                           <m:sSup>
                             <m:sSupPr>
                               <m:ctrlPr>
-                                <a:rPr lang="en-US" sz="2400" i="1">
+                                <a:rPr lang="en-US" sz="2000" i="1">
                                   <a:latin typeface="Cambria Math" panose="02040503050406030204" pitchFamily="18" charset="0"/>
                                 </a:rPr>
                               </m:ctrlPr>
                             </m:sSupPr>
                             <m:e>
                               <m:r>
-                                <a:rPr lang="en-US" sz="2400" i="1">
+                                <a:rPr lang="en-US" sz="2000" i="1">
                                   <a:latin typeface="Cambria Math" panose="02040503050406030204" pitchFamily="18" charset="0"/>
                                 </a:rPr>
                                 <m:t>𝜕</m:t>
@@ -5123,7 +5240,7 @@
                             </m:e>
                             <m:sup>
                               <m:r>
-                                <a:rPr lang="en-US" sz="2400" i="1">
+                                <a:rPr lang="en-US" sz="2000" i="1">
                                   <a:latin typeface="Cambria Math" panose="02040503050406030204" pitchFamily="18" charset="0"/>
                                 </a:rPr>
                                 <m:t>2</m:t>
@@ -5131,7 +5248,7 @@
                             </m:sup>
                           </m:sSup>
                           <m:r>
-                            <a:rPr lang="en-US" sz="2400" i="1">
+                            <a:rPr lang="en-US" sz="2000" i="1">
                               <a:latin typeface="Cambria Math" panose="02040503050406030204" pitchFamily="18" charset="0"/>
                             </a:rPr>
                             <m:t>𝑇</m:t>
@@ -5139,7 +5256,7 @@
                         </m:num>
                         <m:den>
                           <m:r>
-                            <a:rPr lang="en-US" sz="2400" i="1">
+                            <a:rPr lang="en-US" sz="2000" i="1">
                               <a:latin typeface="Cambria Math" panose="02040503050406030204" pitchFamily="18" charset="0"/>
                             </a:rPr>
                             <m:t>𝜕</m:t>
@@ -5147,14 +5264,14 @@
                           <m:sSup>
                             <m:sSupPr>
                               <m:ctrlPr>
-                                <a:rPr lang="en-US" sz="2400" i="1">
+                                <a:rPr lang="en-US" sz="2000" i="1">
                                   <a:latin typeface="Cambria Math" panose="02040503050406030204" pitchFamily="18" charset="0"/>
                                 </a:rPr>
                               </m:ctrlPr>
                             </m:sSupPr>
                             <m:e>
                               <m:r>
-                                <a:rPr lang="en-US" sz="2400" i="1">
+                                <a:rPr lang="en-US" sz="2000" i="1">
                                   <a:latin typeface="Cambria Math" panose="02040503050406030204" pitchFamily="18" charset="0"/>
                                 </a:rPr>
                                 <m:t>𝑡</m:t>
@@ -5162,7 +5279,7 @@
                             </m:e>
                             <m:sup>
                               <m:r>
-                                <a:rPr lang="en-US" sz="2400" i="1">
+                                <a:rPr lang="en-US" sz="2000" i="1">
                                   <a:latin typeface="Cambria Math" panose="02040503050406030204" pitchFamily="18" charset="0"/>
                                 </a:rPr>
                                 <m:t>2</m:t>
@@ -5172,7 +5289,7 @@
                         </m:den>
                       </m:f>
                       <m:r>
-                        <a:rPr lang="en-US" sz="2400" i="1">
+                        <a:rPr lang="en-US" sz="2000" i="1">
                           <a:latin typeface="Cambria Math" panose="02040503050406030204" pitchFamily="18" charset="0"/>
                         </a:rPr>
                         <m:t>−</m:t>
@@ -5180,14 +5297,14 @@
                       <m:sSub>
                         <m:sSubPr>
                           <m:ctrlPr>
-                            <a:rPr lang="en-US" sz="2400" i="1">
+                            <a:rPr lang="en-US" sz="2000" i="1">
                               <a:latin typeface="Cambria Math" panose="02040503050406030204" pitchFamily="18" charset="0"/>
                             </a:rPr>
                           </m:ctrlPr>
                         </m:sSubPr>
                         <m:e>
                           <m:r>
-                            <a:rPr lang="en-US" sz="2400" i="1">
+                            <a:rPr lang="en-US" sz="2000" i="1">
                               <a:latin typeface="Cambria Math" panose="02040503050406030204" pitchFamily="18" charset="0"/>
                             </a:rPr>
                             <m:t>𝑞</m:t>
@@ -5195,7 +5312,7 @@
                         </m:e>
                         <m:sub>
                           <m:r>
-                            <a:rPr lang="en-US" sz="2400" i="1">
+                            <a:rPr lang="en-US" sz="2000" i="1">
                               <a:latin typeface="Cambria Math" panose="02040503050406030204" pitchFamily="18" charset="0"/>
                             </a:rPr>
                             <m:t>𝑧</m:t>
@@ -5205,14 +5322,14 @@
                       <m:sSub>
                         <m:sSubPr>
                           <m:ctrlPr>
-                            <a:rPr lang="en-US" sz="2400" i="1">
+                            <a:rPr lang="en-US" sz="2000" i="1">
                               <a:latin typeface="Cambria Math" panose="02040503050406030204" pitchFamily="18" charset="0"/>
                             </a:rPr>
                           </m:ctrlPr>
                         </m:sSubPr>
                         <m:e>
                           <m:r>
-                            <a:rPr lang="en-US" sz="2400" i="1">
+                            <a:rPr lang="en-US" sz="2000" i="1">
                               <a:latin typeface="Cambria Math" panose="02040503050406030204" pitchFamily="18" charset="0"/>
                             </a:rPr>
                             <m:t>𝐶</m:t>
@@ -5220,7 +5337,7 @@
                         </m:e>
                         <m:sub>
                           <m:r>
-                            <a:rPr lang="en-US" sz="2400" i="1">
+                            <a:rPr lang="en-US" sz="2000" i="1">
                               <a:latin typeface="Cambria Math" panose="02040503050406030204" pitchFamily="18" charset="0"/>
                             </a:rPr>
                             <m:t>𝑤</m:t>
@@ -5230,20 +5347,20 @@
                       <m:f>
                         <m:fPr>
                           <m:ctrlPr>
-                            <a:rPr lang="en-US" sz="2400" i="1">
+                            <a:rPr lang="en-US" sz="2000" i="1">
                               <a:latin typeface="Cambria Math" panose="02040503050406030204" pitchFamily="18" charset="0"/>
                             </a:rPr>
                           </m:ctrlPr>
                         </m:fPr>
                         <m:num>
                           <m:r>
-                            <a:rPr lang="en-US" sz="2400" i="1">
+                            <a:rPr lang="en-US" sz="2000" i="1">
                               <a:latin typeface="Cambria Math" panose="02040503050406030204" pitchFamily="18" charset="0"/>
                             </a:rPr>
                             <m:t>𝜕</m:t>
                           </m:r>
                           <m:r>
-                            <a:rPr lang="en-US" sz="2400" i="1">
+                            <a:rPr lang="en-US" sz="2000" i="1">
                               <a:latin typeface="Cambria Math" panose="02040503050406030204" pitchFamily="18" charset="0"/>
                             </a:rPr>
                             <m:t>𝑇</m:t>
@@ -5251,13 +5368,13 @@
                         </m:num>
                         <m:den>
                           <m:r>
-                            <a:rPr lang="en-US" sz="2400" i="1">
+                            <a:rPr lang="en-US" sz="2000" i="1">
                               <a:latin typeface="Cambria Math" panose="02040503050406030204" pitchFamily="18" charset="0"/>
                             </a:rPr>
                             <m:t>𝜕</m:t>
                           </m:r>
                           <m:r>
-                            <a:rPr lang="en-US" sz="2400" i="1">
+                            <a:rPr lang="en-US" sz="2000" i="1">
                               <a:latin typeface="Cambria Math" panose="02040503050406030204" pitchFamily="18" charset="0"/>
                             </a:rPr>
                             <m:t>𝑧</m:t>
@@ -5265,7 +5382,7 @@
                         </m:den>
                       </m:f>
                       <m:r>
-                        <a:rPr lang="en-US" sz="2400" i="1">
+                        <a:rPr lang="en-US" sz="2000" i="1">
                           <a:latin typeface="Cambria Math" panose="02040503050406030204" pitchFamily="18" charset="0"/>
                         </a:rPr>
                         <m:t>=</m:t>
@@ -5273,20 +5390,20 @@
                       <m:f>
                         <m:fPr>
                           <m:ctrlPr>
-                            <a:rPr lang="en-US" sz="2400" i="1">
+                            <a:rPr lang="en-US" sz="2000" i="1">
                               <a:latin typeface="Cambria Math" panose="02040503050406030204" pitchFamily="18" charset="0"/>
                             </a:rPr>
                           </m:ctrlPr>
                         </m:fPr>
                         <m:num>
                           <m:r>
-                            <a:rPr lang="en-US" sz="2400" i="1">
+                            <a:rPr lang="en-US" sz="2000" i="1">
                               <a:latin typeface="Cambria Math" panose="02040503050406030204" pitchFamily="18" charset="0"/>
                             </a:rPr>
                             <m:t>𝜕</m:t>
                           </m:r>
                           <m:r>
-                            <a:rPr lang="en-US" sz="2400" i="1">
+                            <a:rPr lang="en-US" sz="2000" i="1">
                               <a:latin typeface="Cambria Math" panose="02040503050406030204" pitchFamily="18" charset="0"/>
                             </a:rPr>
                             <m:t>𝑇</m:t>
@@ -5294,13 +5411,13 @@
                         </m:num>
                         <m:den>
                           <m:r>
-                            <a:rPr lang="en-US" sz="2400" i="1">
+                            <a:rPr lang="en-US" sz="2000" i="1">
                               <a:latin typeface="Cambria Math" panose="02040503050406030204" pitchFamily="18" charset="0"/>
                             </a:rPr>
                             <m:t>𝜕</m:t>
                           </m:r>
                           <m:r>
-                            <a:rPr lang="en-US" sz="2400" i="1">
+                            <a:rPr lang="en-US" sz="2000" i="1">
                               <a:latin typeface="Cambria Math" panose="02040503050406030204" pitchFamily="18" charset="0"/>
                             </a:rPr>
                             <m:t>𝑡</m:t>
@@ -5308,13 +5425,13 @@
                         </m:den>
                       </m:f>
                       <m:r>
-                        <a:rPr lang="en-US" sz="2400" i="1">
+                        <a:rPr lang="en-US" sz="2000" i="1">
                           <a:latin typeface="Cambria Math" panose="02040503050406030204" pitchFamily="18" charset="0"/>
                         </a:rPr>
                         <m:t>(</m:t>
                       </m:r>
                       <m:r>
-                        <a:rPr lang="en-US" sz="2400" i="1">
+                        <a:rPr lang="en-US" sz="2000" i="1">
                           <a:latin typeface="Cambria Math" panose="02040503050406030204" pitchFamily="18" charset="0"/>
                         </a:rPr>
                         <m:t>𝜙</m:t>
@@ -5322,14 +5439,14 @@
                       <m:sSub>
                         <m:sSubPr>
                           <m:ctrlPr>
-                            <a:rPr lang="en-US" sz="2400" i="1">
+                            <a:rPr lang="en-US" sz="2000" i="1">
                               <a:latin typeface="Cambria Math" panose="02040503050406030204" pitchFamily="18" charset="0"/>
                             </a:rPr>
                           </m:ctrlPr>
                         </m:sSubPr>
                         <m:e>
                           <m:r>
-                            <a:rPr lang="en-US" sz="2400" i="1">
+                            <a:rPr lang="en-US" sz="2000" i="1">
                               <a:latin typeface="Cambria Math" panose="02040503050406030204" pitchFamily="18" charset="0"/>
                             </a:rPr>
                             <m:t>𝐶</m:t>
@@ -5337,7 +5454,7 @@
                         </m:e>
                         <m:sub>
                           <m:r>
-                            <a:rPr lang="en-US" sz="2400" i="1">
+                            <a:rPr lang="en-US" sz="2000" i="1">
                               <a:latin typeface="Cambria Math" panose="02040503050406030204" pitchFamily="18" charset="0"/>
                             </a:rPr>
                             <m:t>𝑤</m:t>
@@ -5345,19 +5462,19 @@
                         </m:sub>
                       </m:sSub>
                       <m:r>
-                        <a:rPr lang="en-US" sz="2400" i="1">
+                        <a:rPr lang="en-US" sz="2000" i="1">
                           <a:latin typeface="Cambria Math" panose="02040503050406030204" pitchFamily="18" charset="0"/>
                         </a:rPr>
                         <m:t>+(1−</m:t>
                       </m:r>
                       <m:r>
-                        <a:rPr lang="en-US" sz="2400" i="1">
+                        <a:rPr lang="en-US" sz="2000" i="1">
                           <a:latin typeface="Cambria Math" panose="02040503050406030204" pitchFamily="18" charset="0"/>
                         </a:rPr>
                         <m:t>𝜙</m:t>
                       </m:r>
                       <m:r>
-                        <a:rPr lang="en-US" sz="2400" i="1">
+                        <a:rPr lang="en-US" sz="2000" i="1">
                           <a:latin typeface="Cambria Math" panose="02040503050406030204" pitchFamily="18" charset="0"/>
                         </a:rPr>
                         <m:t>)</m:t>
@@ -5365,14 +5482,14 @@
                       <m:sSub>
                         <m:sSubPr>
                           <m:ctrlPr>
-                            <a:rPr lang="en-US" sz="2400" i="1">
+                            <a:rPr lang="en-US" sz="2000" i="1">
                               <a:latin typeface="Cambria Math" panose="02040503050406030204" pitchFamily="18" charset="0"/>
                             </a:rPr>
                           </m:ctrlPr>
                         </m:sSubPr>
                         <m:e>
                           <m:r>
-                            <a:rPr lang="en-US" sz="2400" i="1">
+                            <a:rPr lang="en-US" sz="2000" i="1">
                               <a:latin typeface="Cambria Math" panose="02040503050406030204" pitchFamily="18" charset="0"/>
                             </a:rPr>
                             <m:t>𝐶</m:t>
@@ -5380,7 +5497,7 @@
                         </m:e>
                         <m:sub>
                           <m:r>
-                            <a:rPr lang="en-US" sz="2400" i="1">
+                            <a:rPr lang="en-US" sz="2000" i="1">
                               <a:latin typeface="Cambria Math" panose="02040503050406030204" pitchFamily="18" charset="0"/>
                             </a:rPr>
                             <m:t>𝑠</m:t>
@@ -5388,7 +5505,7 @@
                         </m:sub>
                       </m:sSub>
                       <m:r>
-                        <a:rPr lang="en-US" sz="2400" i="1">
+                        <a:rPr lang="en-US" sz="2000" i="1">
                           <a:latin typeface="Cambria Math" panose="02040503050406030204" pitchFamily="18" charset="0"/>
                         </a:rPr>
                         <m:t>)</m:t>
@@ -5396,12 +5513,12 @@
                     </m:oMath>
                   </m:oMathPara>
                 </a14:m>
-                <a:endParaRPr lang="en-US" sz="2400" dirty="0">
+                <a:endParaRPr lang="en-US" sz="2000" dirty="0">
                   <a:latin typeface="Frutiger Light Condensed" panose="020B0406020504020204" pitchFamily="34" charset="0"/>
                 </a:endParaRPr>
               </a:p>
               <a:p>
-                <a:endParaRPr lang="en-US" sz="2400" dirty="0">
+                <a:endParaRPr lang="en-US" sz="2000" dirty="0">
                   <a:latin typeface="Frutiger Light Condensed" panose="020B0406020504020204" pitchFamily="34" charset="0"/>
                 </a:endParaRPr>
               </a:p>
@@ -5419,8 +5536,8 @@
             </p:nvSpPr>
             <p:spPr>
               <a:xfrm>
-                <a:off x="704873" y="22254083"/>
-                <a:ext cx="8148699" cy="1202765"/>
+                <a:off x="5413159" y="16167854"/>
+                <a:ext cx="8148699" cy="1017651"/>
               </a:xfrm>
               <a:prstGeom prst="rect">
                 <a:avLst/>
@@ -5458,14 +5575,14 @@
               <p:nvPr>
                 <p:extLst>
                   <p:ext uri="{D42A27DB-BD31-4B8C-83A1-F6EECF244321}">
-                    <p14:modId xmlns:p14="http://schemas.microsoft.com/office/powerpoint/2010/main" val="1876603820"/>
+                    <p14:modId xmlns:p14="http://schemas.microsoft.com/office/powerpoint/2010/main" val="1038713473"/>
                   </p:ext>
                 </p:extLst>
               </p:nvPr>
             </p:nvGraphicFramePr>
             <p:xfrm>
-              <a:off x="9399992" y="16435753"/>
-              <a:ext cx="3073362" cy="6769637"/>
+              <a:off x="9424315" y="18362010"/>
+              <a:ext cx="2920085" cy="5572497"/>
             </p:xfrm>
             <a:graphic>
               <a:graphicData uri="http://schemas.openxmlformats.org/drawingml/2006/table">
@@ -5474,8 +5591,8 @@
                     <a:tableStyleId>{5202B0CA-FC54-4496-8BCA-5EF66A818D29}</a:tableStyleId>
                   </a:tblPr>
                   <a:tblGrid>
-                    <a:gridCol w="1901054"/>
-                    <a:gridCol w="1172308"/>
+                    <a:gridCol w="1806243"/>
+                    <a:gridCol w="1113842"/>
                   </a:tblGrid>
                   <a:tr h="481579">
                     <a:tc>
@@ -5495,7 +5612,7 @@
                             </a:spcAft>
                           </a:pPr>
                           <a:r>
-                            <a:rPr lang="en-US" sz="2400" b="0" dirty="0">
+                            <a:rPr lang="en-US" sz="1800" b="1" u="sng" dirty="0">
                               <a:solidFill>
                                 <a:schemeClr val="tx1"/>
                               </a:solidFill>
@@ -5504,7 +5621,7 @@
                             </a:rPr>
                             <a:t>Parameter</a:t>
                           </a:r>
-                          <a:endParaRPr lang="en-US" sz="2400" b="0" dirty="0">
+                          <a:endParaRPr lang="en-US" sz="1800" b="1" u="sng" dirty="0">
                             <a:solidFill>
                               <a:schemeClr val="tx1"/>
                             </a:solidFill>
@@ -5582,7 +5699,7 @@
                             </a:spcAft>
                           </a:pPr>
                           <a:r>
-                            <a:rPr lang="en-US" sz="2400" b="0" dirty="0">
+                            <a:rPr lang="en-US" sz="1800" b="1" u="sng" dirty="0">
                               <a:solidFill>
                                 <a:schemeClr val="tx1"/>
                               </a:solidFill>
@@ -5591,7 +5708,7 @@
                             </a:rPr>
                             <a:t>Symbol</a:t>
                           </a:r>
-                          <a:endParaRPr lang="en-US" sz="2400" b="0" dirty="0">
+                          <a:endParaRPr lang="en-US" sz="1800" b="1" u="sng" dirty="0">
                             <a:solidFill>
                               <a:schemeClr val="tx1"/>
                             </a:solidFill>
@@ -5653,7 +5770,7 @@
                       </a:tcPr>
                     </a:tc>
                   </a:tr>
-                  <a:tr h="912435">
+                  <a:tr h="684868">
                     <a:tc>
                       <a:txBody>
                         <a:bodyPr/>
@@ -5671,20 +5788,20 @@
                             </a:spcAft>
                           </a:pPr>
                           <a:r>
-                            <a:rPr lang="en-US" sz="2400" b="0" dirty="0">
+                            <a:rPr lang="en-US" sz="1800" b="0" dirty="0">
                               <a:effectLst/>
                               <a:latin typeface="Frutiger Light Condensed" panose="020B0406020504020204" pitchFamily="34" charset="0"/>
                             </a:rPr>
                             <a:t>Hydraulic </a:t>
                           </a:r>
                           <a:r>
-                            <a:rPr lang="en-US" sz="2400" b="0" dirty="0" smtClean="0">
+                            <a:rPr lang="en-US" sz="1800" b="0" dirty="0" smtClean="0">
                               <a:effectLst/>
                               <a:latin typeface="Frutiger Light Condensed" panose="020B0406020504020204" pitchFamily="34" charset="0"/>
                             </a:rPr>
                             <a:t>conductivity</a:t>
                           </a:r>
-                          <a:endParaRPr lang="en-US" sz="2400" b="0" dirty="0">
+                          <a:endParaRPr lang="en-US" sz="1800" b="0" dirty="0">
                             <a:effectLst/>
                             <a:latin typeface="Frutiger Light Condensed" panose="020B0406020504020204" pitchFamily="34" charset="0"/>
                             <a:ea typeface="Calibri" panose="020F0502020204030204" pitchFamily="34" charset="0"/>
@@ -5765,7 +5882,7 @@
                               </m:oMathParaPr>
                               <m:oMath xmlns:m="http://schemas.openxmlformats.org/officeDocument/2006/math">
                                 <m:r>
-                                  <a:rPr lang="en-US" sz="2400" b="0" i="1" smtClean="0">
+                                  <a:rPr lang="en-US" sz="1800" b="0" i="1" smtClean="0">
                                     <a:latin typeface="Cambria Math" panose="02040503050406030204" pitchFamily="18" charset="0"/>
                                   </a:rPr>
                                   <m:t>𝐾</m:t>
@@ -5773,7 +5890,7 @@
                               </m:oMath>
                             </m:oMathPara>
                           </a14:m>
-                          <a:endParaRPr lang="en-US" sz="2400" b="0" dirty="0">
+                          <a:endParaRPr lang="en-US" sz="1800" b="0" dirty="0">
                             <a:effectLst/>
                             <a:latin typeface="Frutiger Light Condensed" panose="020B0406020504020204" pitchFamily="34" charset="0"/>
                             <a:ea typeface="Calibri" panose="020F0502020204030204" pitchFamily="34" charset="0"/>
@@ -5850,13 +5967,13 @@
                             </a:spcAft>
                           </a:pPr>
                           <a:r>
-                            <a:rPr lang="en-US" sz="2400" b="0" dirty="0">
+                            <a:rPr lang="en-US" sz="1800" b="0" dirty="0">
                               <a:effectLst/>
                               <a:latin typeface="Frutiger Light Condensed" panose="020B0406020504020204" pitchFamily="34" charset="0"/>
                             </a:rPr>
                             <a:t>Porosity</a:t>
                           </a:r>
-                          <a:endParaRPr lang="en-US" sz="2400" b="0" dirty="0">
+                          <a:endParaRPr lang="en-US" sz="1800" b="0" dirty="0">
                             <a:effectLst/>
                             <a:latin typeface="Frutiger Light Condensed" panose="020B0406020504020204" pitchFamily="34" charset="0"/>
                             <a:ea typeface="Calibri" panose="020F0502020204030204" pitchFamily="34" charset="0"/>
@@ -5931,13 +6048,13 @@
                             </a:spcAft>
                           </a:pPr>
                           <a:r>
-                            <a:rPr lang="en-US" sz="2400" b="0">
+                            <a:rPr lang="en-US" sz="1800" b="0">
                               <a:effectLst/>
                               <a:latin typeface="Frutiger Light Condensed" panose="020B0406020504020204" pitchFamily="34" charset="0"/>
                             </a:rPr>
                             <a:t>φ</a:t>
                           </a:r>
-                          <a:endParaRPr lang="en-US" sz="2400" b="0">
+                          <a:endParaRPr lang="en-US" sz="1800" b="0">
                             <a:effectLst/>
                             <a:latin typeface="Frutiger Light Condensed" panose="020B0406020504020204" pitchFamily="34" charset="0"/>
                             <a:ea typeface="Calibri" panose="020F0502020204030204" pitchFamily="34" charset="0"/>
@@ -5996,7 +6113,7 @@
                       </a:tcPr>
                     </a:tc>
                   </a:tr>
-                  <a:tr h="1219200">
+                  <a:tr h="709246">
                     <a:tc>
                       <a:txBody>
                         <a:bodyPr/>
@@ -6014,20 +6131,20 @@
                             </a:spcAft>
                           </a:pPr>
                           <a:r>
-                            <a:rPr lang="en-US" sz="2400" b="0" dirty="0">
+                            <a:rPr lang="en-US" sz="1800" b="0" dirty="0">
                               <a:effectLst/>
                               <a:latin typeface="Frutiger Light Condensed" panose="020B0406020504020204" pitchFamily="34" charset="0"/>
                             </a:rPr>
                             <a:t>Saturated </a:t>
                           </a:r>
                           <a:r>
-                            <a:rPr lang="en-US" sz="2400" b="0" dirty="0" smtClean="0">
+                            <a:rPr lang="en-US" sz="1800" b="0" dirty="0" smtClean="0">
                               <a:effectLst/>
                               <a:latin typeface="Frutiger Light Condensed" panose="020B0406020504020204" pitchFamily="34" charset="0"/>
                             </a:rPr>
                             <a:t>thermal conductivity</a:t>
                           </a:r>
-                          <a:endParaRPr lang="en-US" sz="2400" b="0" dirty="0">
+                          <a:endParaRPr lang="en-US" sz="1800" b="0" dirty="0">
                             <a:effectLst/>
                             <a:latin typeface="Frutiger Light Condensed" panose="020B0406020504020204" pitchFamily="34" charset="0"/>
                             <a:ea typeface="Calibri" panose="020F0502020204030204" pitchFamily="34" charset="0"/>
@@ -6110,7 +6227,7 @@
                                 <m:sSub>
                                   <m:sSubPr>
                                     <m:ctrlPr>
-                                      <a:rPr lang="en-US" sz="2400" b="0" i="1">
+                                      <a:rPr lang="en-US" sz="1800" b="0" i="1">
                                         <a:effectLst/>
                                         <a:latin typeface="Cambria Math" panose="02040503050406030204" pitchFamily="18" charset="0"/>
                                       </a:rPr>
@@ -6118,7 +6235,7 @@
                                   </m:sSubPr>
                                   <m:e>
                                     <m:r>
-                                      <a:rPr lang="en-US" sz="2400" b="0" i="1">
+                                      <a:rPr lang="en-US" sz="1800" b="0" i="1">
                                         <a:effectLst/>
                                         <a:latin typeface="Cambria Math" panose="02040503050406030204" pitchFamily="18" charset="0"/>
                                       </a:rPr>
@@ -6127,7 +6244,7 @@
                                   </m:e>
                                   <m:sub>
                                     <m:r>
-                                      <a:rPr lang="en-US" sz="2400" b="0" i="1">
+                                      <a:rPr lang="en-US" sz="1800" b="0" i="1">
                                         <a:effectLst/>
                                         <a:latin typeface="Cambria Math" panose="02040503050406030204" pitchFamily="18" charset="0"/>
                                       </a:rPr>
@@ -6138,7 +6255,7 @@
                               </m:oMath>
                             </m:oMathPara>
                           </a14:m>
-                          <a:endParaRPr lang="en-US" sz="2400" b="0" dirty="0">
+                          <a:endParaRPr lang="en-US" sz="1800" b="0" dirty="0">
                             <a:effectLst/>
                             <a:latin typeface="Frutiger Light Condensed" panose="020B0406020504020204" pitchFamily="34" charset="0"/>
                             <a:ea typeface="Calibri" panose="020F0502020204030204" pitchFamily="34" charset="0"/>
@@ -6215,20 +6332,20 @@
                             </a:spcAft>
                           </a:pPr>
                           <a:r>
-                            <a:rPr lang="en-US" sz="2400" b="0" dirty="0">
+                            <a:rPr lang="en-US" sz="1800" b="0" dirty="0">
                               <a:effectLst/>
                               <a:latin typeface="Frutiger Light Condensed" panose="020B0406020504020204" pitchFamily="34" charset="0"/>
                             </a:rPr>
                             <a:t>Sediment </a:t>
                           </a:r>
                           <a:r>
-                            <a:rPr lang="en-US" sz="2400" b="0" dirty="0" smtClean="0">
+                            <a:rPr lang="en-US" sz="1800" b="0" dirty="0" smtClean="0">
                               <a:effectLst/>
                               <a:latin typeface="Frutiger Light Condensed" panose="020B0406020504020204" pitchFamily="34" charset="0"/>
                             </a:rPr>
                             <a:t>heat capacity</a:t>
                           </a:r>
-                          <a:endParaRPr lang="en-US" sz="2400" b="0" dirty="0">
+                          <a:endParaRPr lang="en-US" sz="1800" b="0" dirty="0">
                             <a:effectLst/>
                             <a:latin typeface="Frutiger Light Condensed" panose="020B0406020504020204" pitchFamily="34" charset="0"/>
                             <a:ea typeface="Calibri" panose="020F0502020204030204" pitchFamily="34" charset="0"/>
@@ -6309,7 +6426,7 @@
                               </m:oMathParaPr>
                               <m:oMath xmlns:m="http://schemas.openxmlformats.org/officeDocument/2006/math">
                                 <m:r>
-                                  <a:rPr lang="en-US" sz="2400" b="0" i="1">
+                                  <a:rPr lang="en-US" sz="1800" b="0" i="1">
                                     <a:effectLst/>
                                     <a:latin typeface="Cambria Math" panose="02040503050406030204" pitchFamily="18" charset="0"/>
                                   </a:rPr>
@@ -6318,7 +6435,7 @@
                               </m:oMath>
                             </m:oMathPara>
                           </a14:m>
-                          <a:endParaRPr lang="en-US" sz="2400" b="0" dirty="0">
+                          <a:endParaRPr lang="en-US" sz="1800" b="0" dirty="0">
                             <a:effectLst/>
                             <a:latin typeface="Frutiger Light Condensed" panose="020B0406020504020204" pitchFamily="34" charset="0"/>
                             <a:ea typeface="Calibri" panose="020F0502020204030204" pitchFamily="34" charset="0"/>
@@ -6377,7 +6494,7 @@
                       </a:tcPr>
                     </a:tc>
                   </a:tr>
-                  <a:tr h="912435">
+                  <a:tr h="444036">
                     <a:tc>
                       <a:txBody>
                         <a:bodyPr/>
@@ -6395,7 +6512,7 @@
                             </a:spcAft>
                           </a:pPr>
                           <a:r>
-                            <a:rPr lang="en-US" sz="2400" b="0" dirty="0" smtClean="0">
+                            <a:rPr lang="en-US" sz="1800" b="0" dirty="0" smtClean="0">
                               <a:effectLst/>
                               <a:latin typeface="Frutiger Light Condensed" panose="020B0406020504020204" pitchFamily="34" charset="0"/>
                               <a:ea typeface="Calibri" panose="020F0502020204030204" pitchFamily="34" charset="0"/>
@@ -6403,7 +6520,7 @@
                             </a:rPr>
                             <a:t>Water heat capacity</a:t>
                           </a:r>
-                          <a:endParaRPr lang="en-US" sz="2400" b="0" dirty="0">
+                          <a:endParaRPr lang="en-US" sz="1800" b="0" dirty="0">
                             <a:effectLst/>
                             <a:latin typeface="Frutiger Light Condensed" panose="020B0406020504020204" pitchFamily="34" charset="0"/>
                             <a:ea typeface="Calibri" panose="020F0502020204030204" pitchFamily="34" charset="0"/>
@@ -6486,14 +6603,14 @@
                                 <m:sSub>
                                   <m:sSubPr>
                                     <m:ctrlPr>
-                                      <a:rPr lang="en-US" sz="2400" b="0" i="1" smtClean="0">
+                                      <a:rPr lang="en-US" sz="1800" b="0" i="1" smtClean="0">
                                         <a:latin typeface="Cambria Math" panose="02040503050406030204" pitchFamily="18" charset="0"/>
                                       </a:rPr>
                                     </m:ctrlPr>
                                   </m:sSubPr>
                                   <m:e>
                                     <m:r>
-                                      <a:rPr lang="en-US" sz="2400" b="0" i="1">
+                                      <a:rPr lang="en-US" sz="1800" b="0" i="1">
                                         <a:latin typeface="Cambria Math" panose="02040503050406030204" pitchFamily="18" charset="0"/>
                                       </a:rPr>
                                       <m:t>𝐶</m:t>
@@ -6501,7 +6618,7 @@
                                   </m:e>
                                   <m:sub>
                                     <m:r>
-                                      <a:rPr lang="en-US" sz="2400" b="0" i="1">
+                                      <a:rPr lang="en-US" sz="1800" b="0" i="1">
                                         <a:latin typeface="Cambria Math" panose="02040503050406030204" pitchFamily="18" charset="0"/>
                                       </a:rPr>
                                       <m:t>𝑤</m:t>
@@ -6511,7 +6628,7 @@
                               </m:oMath>
                             </m:oMathPara>
                           </a14:m>
-                          <a:endParaRPr lang="en-US" sz="2400" b="0" dirty="0">
+                          <a:endParaRPr lang="en-US" sz="1800" b="0" dirty="0">
                             <a:effectLst/>
                             <a:latin typeface="Frutiger Light Condensed" panose="020B0406020504020204" pitchFamily="34" charset="0"/>
                             <a:ea typeface="Calibri" panose="020F0502020204030204" pitchFamily="34" charset="0"/>
@@ -6588,13 +6705,13 @@
                             </a:spcAft>
                           </a:pPr>
                           <a:r>
-                            <a:rPr lang="en-US" sz="2400" b="0" dirty="0" smtClean="0">
+                            <a:rPr lang="en-US" sz="1800" b="0" dirty="0" smtClean="0">
                               <a:effectLst/>
                               <a:latin typeface="Frutiger Light Condensed" panose="020B0406020504020204" pitchFamily="34" charset="0"/>
                             </a:rPr>
                             <a:t>head</a:t>
                           </a:r>
-                          <a:endParaRPr lang="en-US" sz="2400" b="0" dirty="0">
+                          <a:endParaRPr lang="en-US" sz="1800" b="0" dirty="0">
                             <a:effectLst/>
                             <a:latin typeface="Frutiger Light Condensed" panose="020B0406020504020204" pitchFamily="34" charset="0"/>
                             <a:ea typeface="Calibri" panose="020F0502020204030204" pitchFamily="34" charset="0"/>
@@ -6675,7 +6792,7 @@
                               </m:oMathParaPr>
                               <m:oMath xmlns:m="http://schemas.openxmlformats.org/officeDocument/2006/math">
                                 <m:r>
-                                  <a:rPr lang="en-US" sz="2400" b="0" i="1" smtClean="0">
+                                  <a:rPr lang="en-US" sz="1800" b="0" i="1" smtClean="0">
                                     <a:latin typeface="Cambria Math" panose="02040503050406030204" pitchFamily="18" charset="0"/>
                                   </a:rPr>
                                   <m:t>h</m:t>
@@ -6683,7 +6800,7 @@
                               </m:oMath>
                             </m:oMathPara>
                           </a14:m>
-                          <a:endParaRPr lang="en-US" sz="2400" b="0" dirty="0">
+                          <a:endParaRPr lang="en-US" sz="1800" b="0" dirty="0">
                             <a:effectLst/>
                             <a:latin typeface="Frutiger Light Condensed" panose="020B0406020504020204" pitchFamily="34" charset="0"/>
                             <a:ea typeface="Calibri" panose="020F0502020204030204" pitchFamily="34" charset="0"/>
@@ -6742,7 +6859,7 @@
                       </a:tcPr>
                     </a:tc>
                   </a:tr>
-                  <a:tr h="456218">
+                  <a:tr h="464998">
                     <a:tc>
                       <a:txBody>
                         <a:bodyPr/>
@@ -6760,13 +6877,13 @@
                             </a:spcAft>
                           </a:pPr>
                           <a:r>
-                            <a:rPr lang="en-US" sz="2400" b="0" dirty="0" err="1" smtClean="0">
+                            <a:rPr lang="en-US" sz="1800" b="0" dirty="0" err="1" smtClean="0">
                               <a:effectLst/>
                               <a:latin typeface="Frutiger Light Condensed" panose="020B0406020504020204" pitchFamily="34" charset="0"/>
                             </a:rPr>
                             <a:t>Dispersivity</a:t>
                           </a:r>
-                          <a:endParaRPr lang="en-US" sz="2400" b="0" dirty="0">
+                          <a:endParaRPr lang="en-US" sz="1800" b="0" dirty="0">
                             <a:effectLst/>
                             <a:latin typeface="Frutiger Light Condensed" panose="020B0406020504020204" pitchFamily="34" charset="0"/>
                             <a:ea typeface="Calibri" panose="020F0502020204030204" pitchFamily="34" charset="0"/>
@@ -6841,13 +6958,13 @@
                             </a:spcAft>
                           </a:pPr>
                           <a:r>
-                            <a:rPr lang="en-US" sz="2400" b="0" dirty="0">
+                            <a:rPr lang="en-US" sz="1800" b="0" dirty="0">
                               <a:effectLst/>
                               <a:latin typeface="Frutiger Light Condensed" panose="020B0406020504020204" pitchFamily="34" charset="0"/>
                             </a:rPr>
                             <a:t>α</a:t>
                           </a:r>
-                          <a:endParaRPr lang="en-US" sz="2400" b="0" dirty="0">
+                          <a:endParaRPr lang="en-US" sz="1800" b="0" dirty="0">
                             <a:effectLst/>
                             <a:latin typeface="Frutiger Light Condensed" panose="020B0406020504020204" pitchFamily="34" charset="0"/>
                             <a:ea typeface="Calibri" panose="020F0502020204030204" pitchFamily="34" charset="0"/>
@@ -6924,20 +7041,20 @@
                             </a:spcAft>
                           </a:pPr>
                           <a:r>
-                            <a:rPr lang="en-US" sz="2400" b="0" dirty="0" err="1">
+                            <a:rPr lang="en-US" sz="1800" b="0" dirty="0" err="1">
                               <a:effectLst/>
                               <a:latin typeface="Frutiger Light Condensed" panose="020B0406020504020204" pitchFamily="34" charset="0"/>
                             </a:rPr>
                             <a:t>Hyporheic</a:t>
                           </a:r>
                           <a:r>
-                            <a:rPr lang="en-US" sz="2400" b="0" dirty="0">
+                            <a:rPr lang="en-US" sz="1800" b="0" dirty="0">
                               <a:effectLst/>
                               <a:latin typeface="Frutiger Light Condensed" panose="020B0406020504020204" pitchFamily="34" charset="0"/>
                             </a:rPr>
                             <a:t> flux</a:t>
                           </a:r>
-                          <a:endParaRPr lang="en-US" sz="2400" b="0" dirty="0">
+                          <a:endParaRPr lang="en-US" sz="1800" b="0" dirty="0">
                             <a:effectLst/>
                             <a:latin typeface="Frutiger Light Condensed" panose="020B0406020504020204" pitchFamily="34" charset="0"/>
                             <a:ea typeface="Calibri" panose="020F0502020204030204" pitchFamily="34" charset="0"/>
@@ -7020,7 +7137,7 @@
                                 <m:sSub>
                                   <m:sSubPr>
                                     <m:ctrlPr>
-                                      <a:rPr lang="en-US" sz="2400" b="0" i="1">
+                                      <a:rPr lang="en-US" sz="1800" b="0" i="1">
                                         <a:effectLst/>
                                         <a:latin typeface="Cambria Math" panose="02040503050406030204" pitchFamily="18" charset="0"/>
                                       </a:rPr>
@@ -7028,7 +7145,7 @@
                                   </m:sSubPr>
                                   <m:e>
                                     <m:r>
-                                      <a:rPr lang="en-US" sz="2400" b="0" i="1">
+                                      <a:rPr lang="en-US" sz="1800" b="0" i="1">
                                         <a:effectLst/>
                                         <a:latin typeface="Cambria Math" panose="02040503050406030204" pitchFamily="18" charset="0"/>
                                       </a:rPr>
@@ -7037,7 +7154,7 @@
                                   </m:e>
                                   <m:sub>
                                     <m:r>
-                                      <a:rPr lang="en-US" sz="2400" b="0" i="1">
+                                      <a:rPr lang="en-US" sz="1800" b="0" i="1">
                                         <a:effectLst/>
                                         <a:latin typeface="Cambria Math" panose="02040503050406030204" pitchFamily="18" charset="0"/>
                                       </a:rPr>
@@ -7048,7 +7165,7 @@
                               </m:oMath>
                             </m:oMathPara>
                           </a14:m>
-                          <a:endParaRPr lang="en-US" sz="2400" b="0" dirty="0">
+                          <a:endParaRPr lang="en-US" sz="1800" b="0" dirty="0">
                             <a:effectLst/>
                             <a:latin typeface="Frutiger Light Condensed" panose="020B0406020504020204" pitchFamily="34" charset="0"/>
                             <a:ea typeface="Calibri" panose="020F0502020204030204" pitchFamily="34" charset="0"/>
@@ -7125,7 +7242,7 @@
                             </a:spcAft>
                           </a:pPr>
                           <a:r>
-                            <a:rPr lang="en-US" sz="2400" b="0" dirty="0" smtClean="0">
+                            <a:rPr lang="en-US" sz="1800" b="0" dirty="0" smtClean="0">
                               <a:effectLst/>
                               <a:latin typeface="Frutiger Light Condensed" panose="020B0406020504020204" pitchFamily="34" charset="0"/>
                               <a:ea typeface="Calibri" panose="020F0502020204030204" pitchFamily="34" charset="0"/>
@@ -7133,7 +7250,7 @@
                             </a:rPr>
                             <a:t>Temperature</a:t>
                           </a:r>
-                          <a:endParaRPr lang="en-US" sz="2400" b="0" dirty="0">
+                          <a:endParaRPr lang="en-US" sz="1800" b="0" dirty="0">
                             <a:effectLst/>
                             <a:latin typeface="Frutiger Light Condensed" panose="020B0406020504020204" pitchFamily="34" charset="0"/>
                             <a:ea typeface="Calibri" panose="020F0502020204030204" pitchFamily="34" charset="0"/>
@@ -7214,7 +7331,7 @@
                               </m:oMathParaPr>
                               <m:oMath xmlns:m="http://schemas.openxmlformats.org/officeDocument/2006/math">
                                 <m:r>
-                                  <a:rPr lang="en-US" sz="2400" b="0" i="1" smtClean="0">
+                                  <a:rPr lang="en-US" sz="1800" b="0" i="1" smtClean="0">
                                     <a:latin typeface="Cambria Math" panose="02040503050406030204" pitchFamily="18" charset="0"/>
                                   </a:rPr>
                                   <m:t>𝑇</m:t>
@@ -7222,7 +7339,7 @@
                               </m:oMath>
                             </m:oMathPara>
                           </a14:m>
-                          <a:endParaRPr lang="en-US" sz="2400" b="0" dirty="0">
+                          <a:endParaRPr lang="en-US" sz="1800" b="0" dirty="0">
                             <a:effectLst/>
                             <a:latin typeface="Frutiger Light Condensed" panose="020B0406020504020204" pitchFamily="34" charset="0"/>
                             <a:ea typeface="Calibri" panose="020F0502020204030204" pitchFamily="34" charset="0"/>
@@ -7296,14 +7413,14 @@
               <p:nvPr>
                 <p:extLst>
                   <p:ext uri="{D42A27DB-BD31-4B8C-83A1-F6EECF244321}">
-                    <p14:modId xmlns:p14="http://schemas.microsoft.com/office/powerpoint/2010/main" val="1876603820"/>
+                    <p14:modId xmlns:p14="http://schemas.microsoft.com/office/powerpoint/2010/main" val="1038713473"/>
                   </p:ext>
                 </p:extLst>
               </p:nvPr>
             </p:nvGraphicFramePr>
             <p:xfrm>
-              <a:off x="9399992" y="16435753"/>
-              <a:ext cx="3073362" cy="6769637"/>
+              <a:off x="9424315" y="18362010"/>
+              <a:ext cx="2920085" cy="5572497"/>
             </p:xfrm>
             <a:graphic>
               <a:graphicData uri="http://schemas.openxmlformats.org/drawingml/2006/table">
@@ -7312,8 +7429,8 @@
                     <a:tableStyleId>{5202B0CA-FC54-4496-8BCA-5EF66A818D29}</a:tableStyleId>
                   </a:tblPr>
                   <a:tblGrid>
-                    <a:gridCol w="1901054"/>
-                    <a:gridCol w="1172308"/>
+                    <a:gridCol w="1806243"/>
+                    <a:gridCol w="1113842"/>
                   </a:tblGrid>
                   <a:tr h="481579">
                     <a:tc>
@@ -7333,7 +7450,7 @@
                             </a:spcAft>
                           </a:pPr>
                           <a:r>
-                            <a:rPr lang="en-US" sz="2400" b="0" dirty="0">
+                            <a:rPr lang="en-US" sz="1800" b="1" u="sng" dirty="0">
                               <a:solidFill>
                                 <a:schemeClr val="tx1"/>
                               </a:solidFill>
@@ -7342,7 +7459,7 @@
                             </a:rPr>
                             <a:t>Parameter</a:t>
                           </a:r>
-                          <a:endParaRPr lang="en-US" sz="2400" b="0" dirty="0">
+                          <a:endParaRPr lang="en-US" sz="1800" b="1" u="sng" dirty="0">
                             <a:solidFill>
                               <a:schemeClr val="tx1"/>
                             </a:solidFill>
@@ -7420,7 +7537,7 @@
                             </a:spcAft>
                           </a:pPr>
                           <a:r>
-                            <a:rPr lang="en-US" sz="2400" b="0" dirty="0">
+                            <a:rPr lang="en-US" sz="1800" b="1" u="sng" dirty="0">
                               <a:solidFill>
                                 <a:schemeClr val="tx1"/>
                               </a:solidFill>
@@ -7429,7 +7546,7 @@
                             </a:rPr>
                             <a:t>Symbol</a:t>
                           </a:r>
-                          <a:endParaRPr lang="en-US" sz="2400" b="0" dirty="0">
+                          <a:endParaRPr lang="en-US" sz="1800" b="1" u="sng" dirty="0">
                             <a:solidFill>
                               <a:schemeClr val="tx1"/>
                             </a:solidFill>
@@ -7491,7 +7608,7 @@
                       </a:tcPr>
                     </a:tc>
                   </a:tr>
-                  <a:tr h="912435">
+                  <a:tr h="684868">
                     <a:tc>
                       <a:txBody>
                         <a:bodyPr/>
@@ -7509,20 +7626,20 @@
                             </a:spcAft>
                           </a:pPr>
                           <a:r>
-                            <a:rPr lang="en-US" sz="2400" b="0" dirty="0">
+                            <a:rPr lang="en-US" sz="1800" b="0" dirty="0">
                               <a:effectLst/>
                               <a:latin typeface="Frutiger Light Condensed" panose="020B0406020504020204" pitchFamily="34" charset="0"/>
                             </a:rPr>
                             <a:t>Hydraulic </a:t>
                           </a:r>
                           <a:r>
-                            <a:rPr lang="en-US" sz="2400" b="0" dirty="0" smtClean="0">
+                            <a:rPr lang="en-US" sz="1800" b="0" dirty="0" smtClean="0">
                               <a:effectLst/>
                               <a:latin typeface="Frutiger Light Condensed" panose="020B0406020504020204" pitchFamily="34" charset="0"/>
                             </a:rPr>
                             <a:t>conductivity</a:t>
                           </a:r>
-                          <a:endParaRPr lang="en-US" sz="2400" b="0" dirty="0">
+                          <a:endParaRPr lang="en-US" sz="1800" b="0" dirty="0">
                             <a:effectLst/>
                             <a:latin typeface="Frutiger Light Condensed" panose="020B0406020504020204" pitchFamily="34" charset="0"/>
                             <a:ea typeface="Calibri" panose="020F0502020204030204" pitchFamily="34" charset="0"/>
@@ -7636,7 +7753,7 @@
                         <a:blipFill rotWithShape="0">
                           <a:blip r:embed="rId11"/>
                           <a:stretch>
-                            <a:fillRect l="-162694" t="-62667" r="-1036" b="-598000"/>
+                            <a:fillRect l="-162842" t="-81416" r="-1639" b="-641593"/>
                           </a:stretch>
                         </a:blipFill>
                       </a:tcPr>
@@ -7660,13 +7777,13 @@
                             </a:spcAft>
                           </a:pPr>
                           <a:r>
-                            <a:rPr lang="en-US" sz="2400" b="0" dirty="0">
+                            <a:rPr lang="en-US" sz="1800" b="0" dirty="0">
                               <a:effectLst/>
                               <a:latin typeface="Frutiger Light Condensed" panose="020B0406020504020204" pitchFamily="34" charset="0"/>
                             </a:rPr>
                             <a:t>Porosity</a:t>
                           </a:r>
-                          <a:endParaRPr lang="en-US" sz="2400" b="0" dirty="0">
+                          <a:endParaRPr lang="en-US" sz="1800" b="0" dirty="0">
                             <a:effectLst/>
                             <a:latin typeface="Frutiger Light Condensed" panose="020B0406020504020204" pitchFamily="34" charset="0"/>
                             <a:ea typeface="Calibri" panose="020F0502020204030204" pitchFamily="34" charset="0"/>
@@ -7741,13 +7858,13 @@
                             </a:spcAft>
                           </a:pPr>
                           <a:r>
-                            <a:rPr lang="en-US" sz="2400" b="0">
+                            <a:rPr lang="en-US" sz="1800" b="0">
                               <a:effectLst/>
                               <a:latin typeface="Frutiger Light Condensed" panose="020B0406020504020204" pitchFamily="34" charset="0"/>
                             </a:rPr>
                             <a:t>φ</a:t>
                           </a:r>
-                          <a:endParaRPr lang="en-US" sz="2400" b="0">
+                          <a:endParaRPr lang="en-US" sz="1800" b="0">
                             <a:effectLst/>
                             <a:latin typeface="Frutiger Light Condensed" panose="020B0406020504020204" pitchFamily="34" charset="0"/>
                             <a:ea typeface="Calibri" panose="020F0502020204030204" pitchFamily="34" charset="0"/>
@@ -7806,7 +7923,7 @@
                       </a:tcPr>
                     </a:tc>
                   </a:tr>
-                  <a:tr h="1219200">
+                  <a:tr h="709246">
                     <a:tc>
                       <a:txBody>
                         <a:bodyPr/>
@@ -7824,20 +7941,20 @@
                             </a:spcAft>
                           </a:pPr>
                           <a:r>
-                            <a:rPr lang="en-US" sz="2400" b="0" dirty="0">
+                            <a:rPr lang="en-US" sz="1800" b="0" dirty="0">
                               <a:effectLst/>
                               <a:latin typeface="Frutiger Light Condensed" panose="020B0406020504020204" pitchFamily="34" charset="0"/>
                             </a:rPr>
                             <a:t>Saturated </a:t>
                           </a:r>
                           <a:r>
-                            <a:rPr lang="en-US" sz="2400" b="0" dirty="0" smtClean="0">
+                            <a:rPr lang="en-US" sz="1800" b="0" dirty="0" smtClean="0">
                               <a:effectLst/>
                               <a:latin typeface="Frutiger Light Condensed" panose="020B0406020504020204" pitchFamily="34" charset="0"/>
                             </a:rPr>
                             <a:t>thermal conductivity</a:t>
                           </a:r>
-                          <a:endParaRPr lang="en-US" sz="2400" b="0" dirty="0">
+                          <a:endParaRPr lang="en-US" sz="1800" b="0" dirty="0">
                             <a:effectLst/>
                             <a:latin typeface="Frutiger Light Condensed" panose="020B0406020504020204" pitchFamily="34" charset="0"/>
                             <a:ea typeface="Calibri" panose="020F0502020204030204" pitchFamily="34" charset="0"/>
@@ -7951,7 +8068,7 @@
                         <a:blipFill rotWithShape="0">
                           <a:blip r:embed="rId11"/>
                           <a:stretch>
-                            <a:fillRect l="-162694" t="-157500" r="-1036" b="-313000"/>
+                            <a:fillRect l="-162842" t="-237931" r="-1639" b="-463793"/>
                           </a:stretch>
                         </a:blipFill>
                       </a:tcPr>
@@ -7975,20 +8092,20 @@
                             </a:spcAft>
                           </a:pPr>
                           <a:r>
-                            <a:rPr lang="en-US" sz="2400" b="0" dirty="0">
+                            <a:rPr lang="en-US" sz="1800" b="0" dirty="0">
                               <a:effectLst/>
                               <a:latin typeface="Frutiger Light Condensed" panose="020B0406020504020204" pitchFamily="34" charset="0"/>
                             </a:rPr>
                             <a:t>Sediment </a:t>
                           </a:r>
                           <a:r>
-                            <a:rPr lang="en-US" sz="2400" b="0" dirty="0" smtClean="0">
+                            <a:rPr lang="en-US" sz="1800" b="0" dirty="0" smtClean="0">
                               <a:effectLst/>
                               <a:latin typeface="Frutiger Light Condensed" panose="020B0406020504020204" pitchFamily="34" charset="0"/>
                             </a:rPr>
                             <a:t>heat capacity</a:t>
                           </a:r>
-                          <a:endParaRPr lang="en-US" sz="2400" b="0" dirty="0">
+                          <a:endParaRPr lang="en-US" sz="1800" b="0" dirty="0">
                             <a:effectLst/>
                             <a:latin typeface="Frutiger Light Condensed" panose="020B0406020504020204" pitchFamily="34" charset="0"/>
                             <a:ea typeface="Calibri" panose="020F0502020204030204" pitchFamily="34" charset="0"/>
@@ -8102,13 +8219,13 @@
                         <a:blipFill rotWithShape="0">
                           <a:blip r:embed="rId11"/>
                           <a:stretch>
-                            <a:fillRect l="-162694" t="-381481" r="-1036" b="-363704"/>
+                            <a:fillRect l="-162842" t="-290370" r="-1639" b="-298519"/>
                           </a:stretch>
                         </a:blipFill>
                       </a:tcPr>
                     </a:tc>
                   </a:tr>
-                  <a:tr h="912435">
+                  <a:tr h="444036">
                     <a:tc>
                       <a:txBody>
                         <a:bodyPr/>
@@ -8126,7 +8243,7 @@
                             </a:spcAft>
                           </a:pPr>
                           <a:r>
-                            <a:rPr lang="en-US" sz="2400" b="0" dirty="0" smtClean="0">
+                            <a:rPr lang="en-US" sz="1800" b="0" dirty="0" smtClean="0">
                               <a:effectLst/>
                               <a:latin typeface="Frutiger Light Condensed" panose="020B0406020504020204" pitchFamily="34" charset="0"/>
                               <a:ea typeface="Calibri" panose="020F0502020204030204" pitchFamily="34" charset="0"/>
@@ -8134,7 +8251,7 @@
                             </a:rPr>
                             <a:t>Water heat capacity</a:t>
                           </a:r>
-                          <a:endParaRPr lang="en-US" sz="2400" b="0" dirty="0">
+                          <a:endParaRPr lang="en-US" sz="1800" b="0" dirty="0">
                             <a:effectLst/>
                             <a:latin typeface="Frutiger Light Condensed" panose="020B0406020504020204" pitchFamily="34" charset="0"/>
                             <a:ea typeface="Calibri" panose="020F0502020204030204" pitchFamily="34" charset="0"/>
@@ -8248,7 +8365,7 @@
                         <a:blipFill rotWithShape="0">
                           <a:blip r:embed="rId11"/>
                           <a:stretch>
-                            <a:fillRect l="-162694" t="-433333" r="-1036" b="-227333"/>
+                            <a:fillRect l="-162842" t="-721918" r="-1639" b="-452055"/>
                           </a:stretch>
                         </a:blipFill>
                       </a:tcPr>
@@ -8272,13 +8389,13 @@
                             </a:spcAft>
                           </a:pPr>
                           <a:r>
-                            <a:rPr lang="en-US" sz="2400" b="0" dirty="0" smtClean="0">
+                            <a:rPr lang="en-US" sz="1800" b="0" dirty="0" smtClean="0">
                               <a:effectLst/>
                               <a:latin typeface="Frutiger Light Condensed" panose="020B0406020504020204" pitchFamily="34" charset="0"/>
                             </a:rPr>
                             <a:t>head</a:t>
                           </a:r>
-                          <a:endParaRPr lang="en-US" sz="2400" b="0" dirty="0">
+                          <a:endParaRPr lang="en-US" sz="1800" b="0" dirty="0">
                             <a:effectLst/>
                             <a:latin typeface="Frutiger Light Condensed" panose="020B0406020504020204" pitchFamily="34" charset="0"/>
                             <a:ea typeface="Calibri" panose="020F0502020204030204" pitchFamily="34" charset="0"/>
@@ -8392,13 +8509,13 @@
                         <a:blipFill rotWithShape="0">
                           <a:blip r:embed="rId11"/>
                           <a:stretch>
-                            <a:fillRect l="-162694" t="-1066667" r="-1036" b="-354667"/>
+                            <a:fillRect l="-162842" t="-789474" r="-1639" b="-334211"/>
                           </a:stretch>
                         </a:blipFill>
                       </a:tcPr>
                     </a:tc>
                   </a:tr>
-                  <a:tr h="456218">
+                  <a:tr h="464998">
                     <a:tc>
                       <a:txBody>
                         <a:bodyPr/>
@@ -8416,13 +8533,13 @@
                             </a:spcAft>
                           </a:pPr>
                           <a:r>
-                            <a:rPr lang="en-US" sz="2400" b="0" dirty="0" err="1" smtClean="0">
+                            <a:rPr lang="en-US" sz="1800" b="0" dirty="0" err="1" smtClean="0">
                               <a:effectLst/>
                               <a:latin typeface="Frutiger Light Condensed" panose="020B0406020504020204" pitchFamily="34" charset="0"/>
                             </a:rPr>
                             <a:t>Dispersivity</a:t>
                           </a:r>
-                          <a:endParaRPr lang="en-US" sz="2400" b="0" dirty="0">
+                          <a:endParaRPr lang="en-US" sz="1800" b="0" dirty="0">
                             <a:effectLst/>
                             <a:latin typeface="Frutiger Light Condensed" panose="020B0406020504020204" pitchFamily="34" charset="0"/>
                             <a:ea typeface="Calibri" panose="020F0502020204030204" pitchFamily="34" charset="0"/>
@@ -8497,13 +8614,13 @@
                             </a:spcAft>
                           </a:pPr>
                           <a:r>
-                            <a:rPr lang="en-US" sz="2400" b="0" dirty="0">
+                            <a:rPr lang="en-US" sz="1800" b="0" dirty="0">
                               <a:effectLst/>
                               <a:latin typeface="Frutiger Light Condensed" panose="020B0406020504020204" pitchFamily="34" charset="0"/>
                             </a:rPr>
                             <a:t>α</a:t>
                           </a:r>
-                          <a:endParaRPr lang="en-US" sz="2400" b="0" dirty="0">
+                          <a:endParaRPr lang="en-US" sz="1800" b="0" dirty="0">
                             <a:effectLst/>
                             <a:latin typeface="Frutiger Light Condensed" panose="020B0406020504020204" pitchFamily="34" charset="0"/>
                             <a:ea typeface="Calibri" panose="020F0502020204030204" pitchFamily="34" charset="0"/>
@@ -8580,20 +8697,20 @@
                             </a:spcAft>
                           </a:pPr>
                           <a:r>
-                            <a:rPr lang="en-US" sz="2400" b="0" dirty="0" err="1">
+                            <a:rPr lang="en-US" sz="1800" b="0" dirty="0" err="1">
                               <a:effectLst/>
                               <a:latin typeface="Frutiger Light Condensed" panose="020B0406020504020204" pitchFamily="34" charset="0"/>
                             </a:rPr>
                             <a:t>Hyporheic</a:t>
                           </a:r>
                           <a:r>
-                            <a:rPr lang="en-US" sz="2400" b="0" dirty="0">
+                            <a:rPr lang="en-US" sz="1800" b="0" dirty="0">
                               <a:effectLst/>
                               <a:latin typeface="Frutiger Light Condensed" panose="020B0406020504020204" pitchFamily="34" charset="0"/>
                             </a:rPr>
                             <a:t> flux</a:t>
                           </a:r>
-                          <a:endParaRPr lang="en-US" sz="2400" b="0" dirty="0">
+                          <a:endParaRPr lang="en-US" sz="1800" b="0" dirty="0">
                             <a:effectLst/>
                             <a:latin typeface="Frutiger Light Condensed" panose="020B0406020504020204" pitchFamily="34" charset="0"/>
                             <a:ea typeface="Calibri" panose="020F0502020204030204" pitchFamily="34" charset="0"/>
@@ -8707,7 +8824,7 @@
                         <a:blipFill rotWithShape="0">
                           <a:blip r:embed="rId11"/>
                           <a:stretch>
-                            <a:fillRect l="-162694" t="-940594" r="-1036" b="-89109"/>
+                            <a:fillRect l="-162842" t="-744554" r="-1639" b="-76238"/>
                           </a:stretch>
                         </a:blipFill>
                       </a:tcPr>
@@ -8731,7 +8848,7 @@
                             </a:spcAft>
                           </a:pPr>
                           <a:r>
-                            <a:rPr lang="en-US" sz="2400" b="0" dirty="0" smtClean="0">
+                            <a:rPr lang="en-US" sz="1800" b="0" dirty="0" smtClean="0">
                               <a:effectLst/>
                               <a:latin typeface="Frutiger Light Condensed" panose="020B0406020504020204" pitchFamily="34" charset="0"/>
                               <a:ea typeface="Calibri" panose="020F0502020204030204" pitchFamily="34" charset="0"/>
@@ -8739,7 +8856,7 @@
                             </a:rPr>
                             <a:t>Temperature</a:t>
                           </a:r>
-                          <a:endParaRPr lang="en-US" sz="2400" b="0" dirty="0">
+                          <a:endParaRPr lang="en-US" sz="1800" b="0" dirty="0">
                             <a:effectLst/>
                             <a:latin typeface="Frutiger Light Condensed" panose="020B0406020504020204" pitchFamily="34" charset="0"/>
                             <a:ea typeface="Calibri" panose="020F0502020204030204" pitchFamily="34" charset="0"/>
@@ -8853,7 +8970,7 @@
                         <a:blipFill rotWithShape="0">
                           <a:blip r:embed="rId11"/>
                           <a:stretch>
-                            <a:fillRect l="-162694" t="-1401333" r="-1036" b="-20000"/>
+                            <a:fillRect l="-162842" t="-1137333" r="-1639" b="-2667"/>
                           </a:stretch>
                         </a:blipFill>
                       </a:tcPr>
@@ -8928,8 +9045,8 @@
           </a:p>
         </p:txBody>
       </p:sp>
-      <mc:AlternateContent xmlns:mc="http://schemas.openxmlformats.org/markup-compatibility/2006">
-        <mc:Choice xmlns:a14="http://schemas.microsoft.com/office/drawing/2010/main" Requires="a14">
+      <mc:AlternateContent xmlns:mc="http://schemas.openxmlformats.org/markup-compatibility/2006" xmlns:a14="http://schemas.microsoft.com/office/drawing/2010/main">
+        <mc:Choice Requires="a14">
           <p:sp>
             <p:nvSpPr>
               <p:cNvPr id="55" name="Rectangle 54"/>
@@ -9129,7 +9246,7 @@
             </p:txBody>
           </p:sp>
         </mc:Choice>
-        <mc:Fallback>
+        <mc:Fallback xmlns="">
           <p:sp>
             <p:nvSpPr>
               <p:cNvPr id="55" name="Rectangle 54"/>
@@ -9168,8 +9285,8 @@
           </p:sp>
         </mc:Fallback>
       </mc:AlternateContent>
-      <mc:AlternateContent xmlns:mc="http://schemas.openxmlformats.org/markup-compatibility/2006">
-        <mc:Choice xmlns:a14="http://schemas.microsoft.com/office/drawing/2010/main" Requires="a14">
+      <mc:AlternateContent xmlns:mc="http://schemas.openxmlformats.org/markup-compatibility/2006" xmlns:a14="http://schemas.microsoft.com/office/drawing/2010/main">
+        <mc:Choice Requires="a14">
           <p:sp>
             <p:nvSpPr>
               <p:cNvPr id="56" name="Rectangle 55"/>
@@ -9343,7 +9460,7 @@
             </p:txBody>
           </p:sp>
         </mc:Choice>
-        <mc:Fallback>
+        <mc:Fallback xmlns="">
           <p:sp>
             <p:nvSpPr>
               <p:cNvPr id="56" name="Rectangle 55"/>
@@ -9546,37 +9663,31 @@
               <a:rPr lang="en-US" sz="3200" dirty="0" smtClean="0">
                 <a:latin typeface="Frutiger Light Condensed" panose="020B0406020504020204" pitchFamily="34" charset="0"/>
               </a:rPr>
-              <a:t>Sediment is characterized by high organic content, low dry bulk density, high porosity </a:t>
+              <a:t>Sediment is characterized by high organic content, low dry bulk density, high porosity [</a:t>
+            </a:r>
+            <a:r>
+              <a:rPr lang="en-US" sz="3200" dirty="0" err="1" smtClean="0">
+                <a:latin typeface="Frutiger Light Condensed" panose="020B0406020504020204" pitchFamily="34" charset="0"/>
+              </a:rPr>
+              <a:t>Mybro</a:t>
             </a:r>
             <a:r>
               <a:rPr lang="en-US" sz="3200" dirty="0" smtClean="0">
                 <a:latin typeface="Frutiger Light Condensed" panose="020B0406020504020204" pitchFamily="34" charset="0"/>
               </a:rPr>
-              <a:t>[</a:t>
-            </a:r>
-            <a:r>
-              <a:rPr lang="en-US" sz="3200" dirty="0" err="1">
-                <a:latin typeface="Frutiger Light Condensed" panose="020B0406020504020204" pitchFamily="34" charset="0"/>
-              </a:rPr>
-              <a:t>Mybro</a:t>
+              <a:t>, </a:t>
             </a:r>
             <a:r>
               <a:rPr lang="en-US" sz="3200" dirty="0">
                 <a:latin typeface="Frutiger Light Condensed" panose="020B0406020504020204" pitchFamily="34" charset="0"/>
               </a:rPr>
-              <a:t>, A., 2013</a:t>
+              <a:t>2013</a:t>
             </a:r>
             <a:r>
               <a:rPr lang="en-US" sz="3200" dirty="0" smtClean="0">
                 <a:latin typeface="Frutiger Light Condensed" panose="020B0406020504020204" pitchFamily="34" charset="0"/>
               </a:rPr>
-              <a:t>.</a:t>
-            </a:r>
-            <a:r>
-              <a:rPr lang="en-US" sz="3200" dirty="0" smtClean="0">
-                <a:latin typeface="Frutiger Light Condensed" panose="020B0406020504020204" pitchFamily="34" charset="0"/>
-              </a:rPr>
-              <a:t>]</a:t>
+              <a:t>.]</a:t>
             </a:r>
           </a:p>
           <a:p>
@@ -9588,19 +9699,19 @@
               <a:rPr lang="en-US" sz="3200" dirty="0" smtClean="0">
                 <a:latin typeface="Frutiger Light Condensed" panose="020B0406020504020204" pitchFamily="34" charset="0"/>
               </a:rPr>
-              <a:t>Measured dry </a:t>
+              <a:t>Measured dry bulk </a:t>
+            </a:r>
+            <a:r>
+              <a:rPr lang="en-US" sz="3200" dirty="0">
+                <a:latin typeface="Frutiger Light Condensed" panose="020B0406020504020204" pitchFamily="34" charset="0"/>
+              </a:rPr>
+              <a:t>density from </a:t>
             </a:r>
             <a:r>
               <a:rPr lang="en-US" sz="3200" dirty="0" smtClean="0">
                 <a:latin typeface="Frutiger Light Condensed" panose="020B0406020504020204" pitchFamily="34" charset="0"/>
               </a:rPr>
-              <a:t>bulk </a:t>
-            </a:r>
-            <a:r>
-              <a:rPr lang="en-US" sz="3200" dirty="0">
-                <a:latin typeface="Frutiger Light Condensed" panose="020B0406020504020204" pitchFamily="34" charset="0"/>
-              </a:rPr>
-              <a:t>density from </a:t>
+              <a:t>[</a:t>
             </a:r>
             <a:r>
               <a:rPr lang="en-US" sz="3200" dirty="0" err="1" smtClean="0">
@@ -9609,34 +9720,28 @@
               <a:t>Mybro</a:t>
             </a:r>
             <a:r>
-              <a:rPr lang="en-US" sz="3200" dirty="0">
-                <a:latin typeface="Frutiger Light Condensed" panose="020B0406020504020204" pitchFamily="34" charset="0"/>
-              </a:rPr>
-              <a:t>, A., </a:t>
-            </a:r>
-            <a:r>
               <a:rPr lang="en-US" sz="3200" dirty="0" smtClean="0">
                 <a:latin typeface="Frutiger Light Condensed" panose="020B0406020504020204" pitchFamily="34" charset="0"/>
               </a:rPr>
-              <a:t>2013. </a:t>
+              <a:t>, </a:t>
             </a:r>
             <a:r>
               <a:rPr lang="en-US" sz="3200" dirty="0" smtClean="0">
                 <a:latin typeface="Frutiger Light Condensed" panose="020B0406020504020204" pitchFamily="34" charset="0"/>
               </a:rPr>
-              <a:t>used </a:t>
+              <a:t>2013</a:t>
             </a:r>
             <a:r>
               <a:rPr lang="en-US" sz="3200" dirty="0" smtClean="0">
                 <a:latin typeface="Frutiger Light Condensed" panose="020B0406020504020204" pitchFamily="34" charset="0"/>
               </a:rPr>
-              <a:t>to estimate the fraction silicate and </a:t>
+              <a:t>.] </a:t>
             </a:r>
             <a:r>
               <a:rPr lang="en-US" sz="3200" dirty="0" smtClean="0">
                 <a:latin typeface="Frutiger Light Condensed" panose="020B0406020504020204" pitchFamily="34" charset="0"/>
               </a:rPr>
-              <a:t>SOM </a:t>
+              <a:t>used to estimate the fraction silicate and SOM </a:t>
             </a:r>
           </a:p>
           <a:p>
@@ -9648,23 +9753,8 @@
               <a:rPr lang="en-US" sz="3200" dirty="0" smtClean="0">
                 <a:latin typeface="Frutiger Light Condensed" panose="020B0406020504020204" pitchFamily="34" charset="0"/>
               </a:rPr>
-              <a:t> 80-90</a:t>
-            </a:r>
-            <a:r>
-              <a:rPr lang="en-US" sz="3200" dirty="0" smtClean="0">
-                <a:latin typeface="Frutiger Light Condensed" panose="020B0406020504020204" pitchFamily="34" charset="0"/>
-              </a:rPr>
-              <a:t>% </a:t>
-            </a:r>
-            <a:r>
-              <a:rPr lang="en-US" sz="3200" dirty="0" smtClean="0">
-                <a:latin typeface="Frutiger Light Condensed" panose="020B0406020504020204" pitchFamily="34" charset="0"/>
-              </a:rPr>
-              <a:t>SOM, 10-20% silicate</a:t>
-            </a:r>
-            <a:endParaRPr lang="en-US" sz="3200" dirty="0" smtClean="0">
-              <a:latin typeface="Frutiger Light Condensed" panose="020B0406020504020204" pitchFamily="34" charset="0"/>
-            </a:endParaRPr>
+              <a:t> 80-90% SOM, 10-20% silicate</a:t>
+            </a:r>
           </a:p>
           <a:p>
             <a:pPr marL="457200" indent="-457200">
@@ -9675,31 +9765,13 @@
               <a:rPr lang="en-US" sz="3200" dirty="0" smtClean="0">
                 <a:latin typeface="Frutiger Light Condensed" panose="020B0406020504020204" pitchFamily="34" charset="0"/>
               </a:rPr>
-              <a:t>Thermal </a:t>
+              <a:t>Thermal conductivity and sediment heat capacity constrained by computing upper and lower bounds based on </a:t>
             </a:r>
             <a:r>
               <a:rPr lang="en-US" sz="3200" dirty="0" smtClean="0">
                 <a:latin typeface="Frutiger Light Condensed" panose="020B0406020504020204" pitchFamily="34" charset="0"/>
               </a:rPr>
-              <a:t>conductivity and sediment heat capacity constrained by computing upper and lower bounds based on </a:t>
-            </a:r>
-            <a:r>
-              <a:rPr lang="en-US" sz="3200" dirty="0" err="1" smtClean="0">
-                <a:latin typeface="Frutiger Light Condensed" panose="020B0406020504020204" pitchFamily="34" charset="0"/>
-              </a:rPr>
-              <a:t>Farouki</a:t>
-            </a:r>
-            <a:r>
-              <a:rPr lang="en-US" sz="3200" dirty="0">
-                <a:latin typeface="Frutiger Light Condensed" panose="020B0406020504020204" pitchFamily="34" charset="0"/>
-              </a:rPr>
-              <a:t>, O., </a:t>
-            </a:r>
-            <a:r>
-              <a:rPr lang="en-US" sz="3200" dirty="0" smtClean="0">
-                <a:latin typeface="Frutiger Light Condensed" panose="020B0406020504020204" pitchFamily="34" charset="0"/>
-              </a:rPr>
-              <a:t>1961</a:t>
+              <a:t>[Farouki,1961]</a:t>
             </a:r>
             <a:endParaRPr lang="en-US" sz="3200" dirty="0" smtClean="0">
               <a:latin typeface="Frutiger Light Condensed" panose="020B0406020504020204" pitchFamily="34" charset="0"/>
@@ -9833,8 +9905,8 @@
         </p:nvSpPr>
         <p:spPr>
           <a:xfrm>
-            <a:off x="1731418" y="21647813"/>
-            <a:ext cx="6427669" cy="584775"/>
+            <a:off x="7461530" y="15658860"/>
+            <a:ext cx="6427669" cy="461665"/>
           </a:xfrm>
           <a:prstGeom prst="rect">
             <a:avLst/>
@@ -9848,18 +9920,18 @@
           <a:lstStyle/>
           <a:p>
             <a:r>
-              <a:rPr lang="en-US" sz="3200" dirty="0" smtClean="0">
+              <a:rPr lang="en-US" sz="2400" dirty="0" smtClean="0">
                 <a:latin typeface="Frutiger Light Condensed" panose="020B0406020504020204" pitchFamily="34" charset="0"/>
               </a:rPr>
               <a:t>Forward model governing </a:t>
             </a:r>
             <a:r>
-              <a:rPr lang="en-US" sz="3200" dirty="0" smtClean="0">
-                <a:latin typeface="Frutiger Light Condensed" panose="020B0406020504020204" pitchFamily="34" charset="0"/>
-              </a:rPr>
-              <a:t>equations:</a:t>
-            </a:r>
-            <a:endParaRPr lang="en-US" sz="3200" dirty="0">
+              <a:rPr lang="en-US" sz="2400" dirty="0" smtClean="0">
+                <a:latin typeface="Frutiger Light Condensed" panose="020B0406020504020204" pitchFamily="34" charset="0"/>
+              </a:rPr>
+              <a:t>equation</a:t>
+            </a:r>
+            <a:endParaRPr lang="en-US" sz="2400" dirty="0">
               <a:latin typeface="Frutiger Light Condensed" panose="020B0406020504020204" pitchFamily="34" charset="0"/>
             </a:endParaRPr>
           </a:p>
@@ -9873,8 +9945,8 @@
         </p:nvSpPr>
         <p:spPr>
           <a:xfrm>
-            <a:off x="653012" y="22232588"/>
-            <a:ext cx="8072323" cy="1623834"/>
+            <a:off x="6537960" y="16117454"/>
+            <a:ext cx="5806440" cy="2038722"/>
           </a:xfrm>
           <a:prstGeom prst="rect">
             <a:avLst/>
@@ -9919,8 +9991,8 @@
         </p:nvSpPr>
         <p:spPr>
           <a:xfrm>
-            <a:off x="6953303" y="21218052"/>
-            <a:ext cx="1843100" cy="369332"/>
+            <a:off x="675461" y="23618028"/>
+            <a:ext cx="2584946" cy="369332"/>
           </a:xfrm>
           <a:prstGeom prst="rect">
             <a:avLst/>
@@ -9937,19 +10009,13 @@
               <a:rPr lang="en-US" dirty="0" smtClean="0">
                 <a:latin typeface="Frutiger Light Condensed" panose="020B0406020504020204" pitchFamily="34" charset="0"/>
               </a:rPr>
-              <a:t>[Koch </a:t>
+              <a:t>[Modified, Koch </a:t>
             </a:r>
             <a:r>
               <a:rPr lang="en-US" dirty="0" smtClean="0">
                 <a:latin typeface="Frutiger Light Condensed" panose="020B0406020504020204" pitchFamily="34" charset="0"/>
               </a:rPr>
-              <a:t>et al. </a:t>
-            </a:r>
-            <a:r>
-              <a:rPr lang="en-US" dirty="0" smtClean="0">
-                <a:latin typeface="Frutiger Light Condensed" panose="020B0406020504020204" pitchFamily="34" charset="0"/>
-              </a:rPr>
-              <a:t>2015]</a:t>
+              <a:t>et al. 2015]</a:t>
             </a:r>
             <a:endParaRPr lang="en-US" dirty="0">
               <a:latin typeface="Frutiger Light Condensed" panose="020B0406020504020204" pitchFamily="34" charset="0"/>
@@ -10139,119 +10205,13 @@
       </p:pic>
       <p:sp>
         <p:nvSpPr>
-          <p:cNvPr id="40" name="TextBox 39"/>
-          <p:cNvSpPr txBox="1"/>
-          <p:nvPr/>
-        </p:nvSpPr>
-        <p:spPr>
-          <a:xfrm>
-            <a:off x="757385" y="12634620"/>
-            <a:ext cx="11753736" cy="3046988"/>
-          </a:xfrm>
-          <a:prstGeom prst="rect">
-            <a:avLst/>
-          </a:prstGeom>
-          <a:noFill/>
-        </p:spPr>
-        <p:txBody>
-          <a:bodyPr wrap="square" rtlCol="0">
-            <a:spAutoFit/>
-          </a:bodyPr>
-          <a:lstStyle/>
-          <a:p>
-            <a:pPr marL="457200" indent="-457200">
-              <a:buFont typeface="Arial" panose="020B0604020202020204" pitchFamily="34" charset="0"/>
-              <a:buChar char="•"/>
-            </a:pPr>
-            <a:r>
-              <a:rPr lang="en-US" sz="3200" dirty="0" err="1" smtClean="0">
-                <a:latin typeface="Frutiger Light Condensed" panose="020B0406020504020204" pitchFamily="34" charset="0"/>
-              </a:rPr>
-              <a:t>Hyporheic</a:t>
-            </a:r>
-            <a:r>
-              <a:rPr lang="en-US" sz="3200" dirty="0" smtClean="0">
-                <a:latin typeface="Frutiger Light Condensed" panose="020B0406020504020204" pitchFamily="34" charset="0"/>
-              </a:rPr>
-              <a:t> flux controls the sediment geochemical gradient and in turn, influences aquatic plants rooted in the </a:t>
-            </a:r>
-            <a:r>
-              <a:rPr lang="en-US" sz="3200" dirty="0" err="1" smtClean="0">
-                <a:latin typeface="Frutiger Light Condensed" panose="020B0406020504020204" pitchFamily="34" charset="0"/>
-              </a:rPr>
-              <a:t>hyporheic</a:t>
-            </a:r>
-            <a:r>
-              <a:rPr lang="en-US" sz="3200" dirty="0" smtClean="0">
-                <a:latin typeface="Frutiger Light Condensed" panose="020B0406020504020204" pitchFamily="34" charset="0"/>
-              </a:rPr>
-              <a:t> zone [Hayashi </a:t>
-            </a:r>
-            <a:r>
-              <a:rPr lang="en-US" sz="3200" dirty="0">
-                <a:latin typeface="Frutiger Light Condensed" panose="020B0406020504020204" pitchFamily="34" charset="0"/>
-              </a:rPr>
-              <a:t>&amp; </a:t>
-            </a:r>
-            <a:r>
-              <a:rPr lang="en-US" sz="3200" dirty="0" err="1">
-                <a:latin typeface="Frutiger Light Condensed" panose="020B0406020504020204" pitchFamily="34" charset="0"/>
-              </a:rPr>
-              <a:t>Rosenberry</a:t>
-            </a:r>
-            <a:r>
-              <a:rPr lang="en-US" sz="3200" dirty="0">
-                <a:latin typeface="Frutiger Light Condensed" panose="020B0406020504020204" pitchFamily="34" charset="0"/>
-              </a:rPr>
-              <a:t> 2002; Kurtz et </a:t>
-            </a:r>
-            <a:r>
-              <a:rPr lang="en-US" sz="3200" dirty="0" smtClean="0">
-                <a:latin typeface="Frutiger Light Condensed" panose="020B0406020504020204" pitchFamily="34" charset="0"/>
-              </a:rPr>
-              <a:t>al. 2007.]</a:t>
-            </a:r>
-            <a:endParaRPr lang="en-US" sz="3200" dirty="0">
-              <a:latin typeface="Frutiger Light Condensed" panose="020B0406020504020204" pitchFamily="34" charset="0"/>
-            </a:endParaRPr>
-          </a:p>
-          <a:p>
-            <a:pPr marL="457200" indent="-457200">
-              <a:buFont typeface="Arial" panose="020B0604020202020204" pitchFamily="34" charset="0"/>
-              <a:buChar char="•"/>
-            </a:pPr>
-            <a:r>
-              <a:rPr lang="en-US" sz="3200" dirty="0" smtClean="0">
-                <a:latin typeface="Frutiger Light Condensed" panose="020B0406020504020204" pitchFamily="34" charset="0"/>
-              </a:rPr>
-              <a:t>Goal: quantify surface water – ground water exchange  at Second Creek</a:t>
-            </a:r>
-          </a:p>
-          <a:p>
-            <a:pPr marL="571500" indent="-571500">
-              <a:buFont typeface="Arial" panose="020B0604020202020204" pitchFamily="34" charset="0"/>
-              <a:buChar char="•"/>
-            </a:pPr>
-            <a:endParaRPr lang="en-US" sz="3200" dirty="0" smtClean="0">
-              <a:latin typeface="Frutiger Light Condensed" panose="020B0406020504020204" pitchFamily="34" charset="0"/>
-            </a:endParaRPr>
-          </a:p>
-          <a:p>
-            <a:endParaRPr lang="en-US" sz="3200" dirty="0">
-              <a:latin typeface="Frutiger Light Condensed" panose="020B0406020504020204" pitchFamily="34" charset="0"/>
-            </a:endParaRPr>
-          </a:p>
-        </p:txBody>
-      </p:sp>
-      <p:sp>
-        <p:nvSpPr>
           <p:cNvPr id="44" name="TextBox 43"/>
           <p:cNvSpPr txBox="1"/>
           <p:nvPr/>
         </p:nvSpPr>
         <p:spPr>
           <a:xfrm>
-            <a:off x="5601297" y="23471630"/>
+            <a:off x="9188744" y="17838383"/>
             <a:ext cx="3195105" cy="369332"/>
           </a:xfrm>
           <a:prstGeom prst="rect">
@@ -11159,6 +11119,268 @@
               <a:solidFill>
                 <a:srgbClr val="FF0000"/>
               </a:solidFill>
+            </a:endParaRPr>
+          </a:p>
+        </p:txBody>
+      </p:sp>
+      <p:sp>
+        <p:nvSpPr>
+          <p:cNvPr id="57" name="TextBox 56"/>
+          <p:cNvSpPr txBox="1"/>
+          <p:nvPr/>
+        </p:nvSpPr>
+        <p:spPr>
+          <a:xfrm>
+            <a:off x="4725645" y="12099209"/>
+            <a:ext cx="1843100" cy="369332"/>
+          </a:xfrm>
+          <a:prstGeom prst="rect">
+            <a:avLst/>
+          </a:prstGeom>
+          <a:noFill/>
+        </p:spPr>
+        <p:txBody>
+          <a:bodyPr wrap="square" rtlCol="0">
+            <a:spAutoFit/>
+          </a:bodyPr>
+          <a:lstStyle/>
+          <a:p>
+            <a:r>
+              <a:rPr lang="en-US" dirty="0" smtClean="0">
+                <a:solidFill>
+                  <a:schemeClr val="bg1"/>
+                </a:solidFill>
+                <a:latin typeface="Frutiger Light Condensed" panose="020B0406020504020204" pitchFamily="34" charset="0"/>
+              </a:rPr>
+              <a:t>[</a:t>
+            </a:r>
+            <a:r>
+              <a:rPr lang="en-US" dirty="0" err="1" smtClean="0">
+                <a:solidFill>
+                  <a:schemeClr val="bg1"/>
+                </a:solidFill>
+                <a:latin typeface="Frutiger Light Condensed" panose="020B0406020504020204" pitchFamily="34" charset="0"/>
+              </a:rPr>
+              <a:t>Yourd</a:t>
+            </a:r>
+            <a:r>
+              <a:rPr lang="en-US" dirty="0" smtClean="0">
+                <a:solidFill>
+                  <a:schemeClr val="bg1"/>
+                </a:solidFill>
+                <a:latin typeface="Frutiger Light Condensed" panose="020B0406020504020204" pitchFamily="34" charset="0"/>
+              </a:rPr>
+              <a:t>, 2017]</a:t>
+            </a:r>
+            <a:endParaRPr lang="en-US" dirty="0">
+              <a:solidFill>
+                <a:schemeClr val="bg1"/>
+              </a:solidFill>
+              <a:latin typeface="Frutiger Light Condensed" panose="020B0406020504020204" pitchFamily="34" charset="0"/>
+            </a:endParaRPr>
+          </a:p>
+        </p:txBody>
+      </p:sp>
+      <p:sp>
+        <p:nvSpPr>
+          <p:cNvPr id="58" name="TextBox 57"/>
+          <p:cNvSpPr txBox="1"/>
+          <p:nvPr/>
+        </p:nvSpPr>
+        <p:spPr>
+          <a:xfrm>
+            <a:off x="21243119" y="12085565"/>
+            <a:ext cx="1843100" cy="369332"/>
+          </a:xfrm>
+          <a:prstGeom prst="rect">
+            <a:avLst/>
+          </a:prstGeom>
+          <a:noFill/>
+        </p:spPr>
+        <p:txBody>
+          <a:bodyPr wrap="square" rtlCol="0">
+            <a:spAutoFit/>
+          </a:bodyPr>
+          <a:lstStyle/>
+          <a:p>
+            <a:r>
+              <a:rPr lang="en-US" dirty="0" smtClean="0">
+                <a:solidFill>
+                  <a:schemeClr val="bg1"/>
+                </a:solidFill>
+                <a:latin typeface="Frutiger Light Condensed" panose="020B0406020504020204" pitchFamily="34" charset="0"/>
+              </a:rPr>
+              <a:t>[</a:t>
+            </a:r>
+            <a:r>
+              <a:rPr lang="en-US" dirty="0" err="1" smtClean="0">
+                <a:solidFill>
+                  <a:schemeClr val="bg1"/>
+                </a:solidFill>
+                <a:latin typeface="Frutiger Light Condensed" panose="020B0406020504020204" pitchFamily="34" charset="0"/>
+              </a:rPr>
+              <a:t>Yourd</a:t>
+            </a:r>
+            <a:r>
+              <a:rPr lang="en-US" dirty="0" smtClean="0">
+                <a:solidFill>
+                  <a:schemeClr val="bg1"/>
+                </a:solidFill>
+                <a:latin typeface="Frutiger Light Condensed" panose="020B0406020504020204" pitchFamily="34" charset="0"/>
+              </a:rPr>
+              <a:t>, 2017]</a:t>
+            </a:r>
+            <a:endParaRPr lang="en-US" dirty="0">
+              <a:solidFill>
+                <a:schemeClr val="bg1"/>
+              </a:solidFill>
+              <a:latin typeface="Frutiger Light Condensed" panose="020B0406020504020204" pitchFamily="34" charset="0"/>
+            </a:endParaRPr>
+          </a:p>
+        </p:txBody>
+      </p:sp>
+      <p:sp>
+        <p:nvSpPr>
+          <p:cNvPr id="11" name="TextBox 10"/>
+          <p:cNvSpPr txBox="1"/>
+          <p:nvPr/>
+        </p:nvSpPr>
+        <p:spPr>
+          <a:xfrm>
+            <a:off x="1177524" y="18305839"/>
+            <a:ext cx="9479280" cy="461665"/>
+          </a:xfrm>
+          <a:prstGeom prst="rect">
+            <a:avLst/>
+          </a:prstGeom>
+          <a:noFill/>
+        </p:spPr>
+        <p:txBody>
+          <a:bodyPr wrap="square" rtlCol="0">
+            <a:spAutoFit/>
+          </a:bodyPr>
+          <a:lstStyle/>
+          <a:p>
+            <a:r>
+              <a:rPr lang="en-US" sz="2400" dirty="0" smtClean="0">
+                <a:latin typeface="Frutiger Light Condensed" panose="020B0406020504020204" pitchFamily="34" charset="0"/>
+              </a:rPr>
+              <a:t>Estimating K by fitting model to observations using 1DTempPro</a:t>
+            </a:r>
+            <a:endParaRPr lang="en-US" sz="2400" dirty="0">
+              <a:latin typeface="Frutiger Light Condensed" panose="020B0406020504020204" pitchFamily="34" charset="0"/>
+            </a:endParaRPr>
+          </a:p>
+        </p:txBody>
+      </p:sp>
+      <p:cxnSp>
+        <p:nvCxnSpPr>
+          <p:cNvPr id="27" name="Straight Arrow Connector 26"/>
+          <p:cNvCxnSpPr/>
+          <p:nvPr/>
+        </p:nvCxnSpPr>
+        <p:spPr>
+          <a:xfrm flipV="1">
+            <a:off x="8661304" y="16858407"/>
+            <a:ext cx="126114" cy="452549"/>
+          </a:xfrm>
+          <a:prstGeom prst="straightConnector1">
+            <a:avLst/>
+          </a:prstGeom>
+          <a:ln>
+            <a:solidFill>
+              <a:srgbClr val="7A0019"/>
+            </a:solidFill>
+            <a:tailEnd type="triangle"/>
+          </a:ln>
+        </p:spPr>
+        <p:style>
+          <a:lnRef idx="3">
+            <a:schemeClr val="dk1"/>
+          </a:lnRef>
+          <a:fillRef idx="0">
+            <a:schemeClr val="dk1"/>
+          </a:fillRef>
+          <a:effectRef idx="2">
+            <a:schemeClr val="dk1"/>
+          </a:effectRef>
+          <a:fontRef idx="minor">
+            <a:schemeClr val="tx1"/>
+          </a:fontRef>
+        </p:style>
+      </p:cxnSp>
+      <p:cxnSp>
+        <p:nvCxnSpPr>
+          <p:cNvPr id="30" name="Straight Arrow Connector 29"/>
+          <p:cNvCxnSpPr>
+            <a:stCxn id="49" idx="1"/>
+          </p:cNvCxnSpPr>
+          <p:nvPr/>
+        </p:nvCxnSpPr>
+        <p:spPr>
+          <a:xfrm flipH="1" flipV="1">
+            <a:off x="7423529" y="16827829"/>
+            <a:ext cx="970826" cy="657236"/>
+          </a:xfrm>
+          <a:prstGeom prst="straightConnector1">
+            <a:avLst/>
+          </a:prstGeom>
+          <a:ln>
+            <a:solidFill>
+              <a:srgbClr val="7A0019"/>
+            </a:solidFill>
+            <a:tailEnd type="triangle"/>
+          </a:ln>
+        </p:spPr>
+        <p:style>
+          <a:lnRef idx="1">
+            <a:schemeClr val="accent1"/>
+          </a:lnRef>
+          <a:fillRef idx="0">
+            <a:schemeClr val="accent1"/>
+          </a:fillRef>
+          <a:effectRef idx="0">
+            <a:schemeClr val="accent1"/>
+          </a:effectRef>
+          <a:fontRef idx="minor">
+            <a:schemeClr val="tx1"/>
+          </a:fontRef>
+        </p:style>
+      </p:cxnSp>
+      <p:sp>
+        <p:nvSpPr>
+          <p:cNvPr id="31" name="TextBox 30"/>
+          <p:cNvSpPr txBox="1"/>
+          <p:nvPr/>
+        </p:nvSpPr>
+        <p:spPr>
+          <a:xfrm>
+            <a:off x="634540" y="15982404"/>
+            <a:ext cx="5616079" cy="2062103"/>
+          </a:xfrm>
+          <a:prstGeom prst="rect">
+            <a:avLst/>
+          </a:prstGeom>
+          <a:noFill/>
+        </p:spPr>
+        <p:txBody>
+          <a:bodyPr wrap="square" rtlCol="0">
+            <a:spAutoFit/>
+          </a:bodyPr>
+          <a:lstStyle/>
+          <a:p>
+            <a:pPr marL="285750" indent="-285750">
+              <a:buFont typeface="Arial" panose="020B0604020202020204" pitchFamily="34" charset="0"/>
+              <a:buChar char="•"/>
+            </a:pPr>
+            <a:r>
+              <a:rPr lang="en-US" sz="3200" dirty="0" smtClean="0">
+                <a:latin typeface="Frutiger Light Condensed" panose="020B0406020504020204" pitchFamily="34" charset="0"/>
+              </a:rPr>
+              <a:t>Hydraulic conductivity is estimated by reducing the residual between a modeled temperature profile and the observed profile</a:t>
+            </a:r>
+            <a:endParaRPr lang="en-US" sz="3200" dirty="0">
+              <a:latin typeface="Frutiger Light Condensed" panose="020B0406020504020204" pitchFamily="34" charset="0"/>
             </a:endParaRPr>
           </a:p>
         </p:txBody>

</xml_diff>